<commit_message>
Little more work on AlphaPres
</commit_message>
<xml_diff>
--- a/Documentation/PresentationAlpha.pptx
+++ b/Documentation/PresentationAlpha.pptx
@@ -3110,7 +3110,9 @@
         </p:nvSpPr>
         <p:spPr/>
         <p:txBody>
-          <a:bodyPr/>
+          <a:bodyPr>
+            <a:normAutofit fontScale="85000" lnSpcReduction="20000"/>
+          </a:bodyPr>
           <a:lstStyle/>
           <a:p>
             <a:pPr marL="514350" indent="-514350">
@@ -3118,8 +3120,48 @@
               <a:buAutoNum type="arabicPeriod"/>
             </a:pPr>
             <a:r>
-              <a:rPr lang="en-US" dirty="0" smtClean="0"/>
-              <a:t>Rock Throw</a:t>
+              <a:rPr lang="en-US" dirty="0"/>
+              <a:t>Player Walk</a:t>
+            </a:r>
+          </a:p>
+          <a:p>
+            <a:pPr marL="514350" indent="-514350">
+              <a:buFont typeface="+mj-lt"/>
+              <a:buAutoNum type="arabicPeriod"/>
+            </a:pPr>
+            <a:r>
+              <a:rPr lang="en-US" dirty="0"/>
+              <a:t>Player Fade Enter</a:t>
+            </a:r>
+          </a:p>
+          <a:p>
+            <a:pPr marL="514350" indent="-514350">
+              <a:buFont typeface="+mj-lt"/>
+              <a:buAutoNum type="arabicPeriod"/>
+            </a:pPr>
+            <a:r>
+              <a:rPr lang="en-US" dirty="0"/>
+              <a:t>Player Fade Exit</a:t>
+            </a:r>
+          </a:p>
+          <a:p>
+            <a:pPr marL="514350" indent="-514350">
+              <a:buFont typeface="+mj-lt"/>
+              <a:buAutoNum type="arabicPeriod"/>
+            </a:pPr>
+            <a:r>
+              <a:rPr lang="en-US" dirty="0" smtClean="0"/>
+              <a:t>Death Sounds For Everything (Except Skeleton)</a:t>
+            </a:r>
+          </a:p>
+          <a:p>
+            <a:pPr marL="514350" indent="-514350">
+              <a:buFont typeface="+mj-lt"/>
+              <a:buAutoNum type="arabicPeriod"/>
+            </a:pPr>
+            <a:r>
+              <a:rPr lang="en-US" dirty="0" smtClean="0"/>
+              <a:t>Unique Hurt Sounds:</a:t>
             </a:r>
           </a:p>
           <a:p>
@@ -3129,7 +3171,7 @@
             </a:pPr>
             <a:r>
               <a:rPr lang="en-US" dirty="0" smtClean="0"/>
-              <a:t>Throw</a:t>
+              <a:t>Ghost</a:t>
             </a:r>
           </a:p>
           <a:p>
@@ -3139,16 +3181,113 @@
             </a:pPr>
             <a:r>
               <a:rPr lang="en-US" dirty="0" smtClean="0"/>
-              <a:t>Impact</a:t>
-            </a:r>
+              <a:t>Staff Ogre</a:t>
+            </a:r>
+          </a:p>
+          <a:p>
+            <a:pPr marL="971550" lvl="1" indent="-514350">
+              <a:buFont typeface="+mj-lt"/>
+              <a:buAutoNum type="arabicPeriod"/>
+            </a:pPr>
+            <a:r>
+              <a:rPr lang="en-US" dirty="0" smtClean="0"/>
+              <a:t>Animated Golem</a:t>
+            </a:r>
+          </a:p>
+          <a:p>
+            <a:pPr marL="971550" lvl="1" indent="-514350">
+              <a:buFont typeface="+mj-lt"/>
+              <a:buAutoNum type="arabicPeriod"/>
+            </a:pPr>
+            <a:r>
+              <a:rPr lang="en-US" dirty="0" smtClean="0"/>
+              <a:t>The Librarian Boss</a:t>
+            </a:r>
+          </a:p>
+          <a:p>
+            <a:pPr marL="971550" lvl="1" indent="-514350">
+              <a:buFont typeface="+mj-lt"/>
+              <a:buAutoNum type="arabicPeriod"/>
+            </a:pPr>
+            <a:r>
+              <a:rPr lang="en-US" dirty="0" smtClean="0"/>
+              <a:t>Flaming Totem</a:t>
+            </a:r>
+          </a:p>
+          <a:p>
+            <a:pPr marL="971550" lvl="1" indent="-514350">
+              <a:buFont typeface="+mj-lt"/>
+              <a:buAutoNum type="arabicPeriod"/>
+            </a:pPr>
+            <a:r>
+              <a:rPr lang="en-US" dirty="0" smtClean="0"/>
+              <a:t>The Dragon Boss</a:t>
+            </a:r>
+          </a:p>
+          <a:p>
+            <a:pPr marL="971550" lvl="1" indent="-514350">
+              <a:buFont typeface="+mj-lt"/>
+              <a:buAutoNum type="arabicPeriod"/>
+            </a:pPr>
+            <a:r>
+              <a:rPr lang="en-US" dirty="0" smtClean="0"/>
+              <a:t>Each Knight of The Three Knights Boss</a:t>
+            </a:r>
+            <a:endParaRPr lang="en-US" dirty="0" smtClean="0"/>
           </a:p>
           <a:p>
             <a:pPr marL="514350" indent="-514350">
               <a:buFont typeface="+mj-lt"/>
               <a:buAutoNum type="arabicPeriod"/>
             </a:pPr>
-            <a:r>
-              <a:rPr lang="en-US" dirty="0" smtClean="0"/>
+            <a:endParaRPr lang="en-US" dirty="0" smtClean="0"/>
+          </a:p>
+          <a:p>
+            <a:pPr marL="514350" indent="-514350">
+              <a:buFont typeface="+mj-lt"/>
+              <a:buAutoNum type="arabicPeriod"/>
+            </a:pPr>
+            <a:endParaRPr lang="en-US" dirty="0" smtClean="0"/>
+          </a:p>
+          <a:p>
+            <a:pPr marL="514350" indent="-514350">
+              <a:buFont typeface="+mj-lt"/>
+              <a:buAutoNum type="arabicPeriod"/>
+            </a:pPr>
+            <a:endParaRPr lang="en-US" dirty="0" smtClean="0"/>
+          </a:p>
+          <a:p>
+            <a:pPr marL="514350" indent="-514350">
+              <a:buFont typeface="+mj-lt"/>
+              <a:buAutoNum type="arabicPeriod"/>
+            </a:pPr>
+            <a:endParaRPr lang="en-US" dirty="0"/>
+          </a:p>
+        </p:txBody>
+      </p:sp>
+      <p:sp>
+        <p:nvSpPr>
+          <p:cNvPr id="4" name="Content Placeholder 3"/>
+          <p:cNvSpPr>
+            <a:spLocks noGrp="1"/>
+          </p:cNvSpPr>
+          <p:nvPr>
+            <p:ph sz="half" idx="2"/>
+          </p:nvPr>
+        </p:nvSpPr>
+        <p:spPr/>
+        <p:txBody>
+          <a:bodyPr>
+            <a:normAutofit fontScale="85000" lnSpcReduction="20000"/>
+          </a:bodyPr>
+          <a:lstStyle/>
+          <a:p>
+            <a:pPr marL="514350" indent="-514350">
+              <a:buFont typeface="+mj-lt"/>
+              <a:buAutoNum type="arabicPeriod"/>
+            </a:pPr>
+            <a:r>
+              <a:rPr lang="en-US" dirty="0"/>
               <a:t>Arc Lightning</a:t>
             </a:r>
           </a:p>
@@ -3158,8 +3297,12 @@
               <a:buAutoNum type="arabicPeriod"/>
             </a:pPr>
             <a:r>
-              <a:rPr lang="en-US" dirty="0" smtClean="0"/>
-              <a:t>Acid Pool</a:t>
+              <a:rPr lang="en-US" dirty="0"/>
+              <a:t>Acid </a:t>
+            </a:r>
+            <a:r>
+              <a:rPr lang="en-US" dirty="0" smtClean="0"/>
+              <a:t>Pool</a:t>
             </a:r>
           </a:p>
           <a:p>
@@ -3168,50 +3311,95 @@
               <a:buAutoNum type="arabicPeriod"/>
             </a:pPr>
             <a:r>
-              <a:rPr lang="en-US" smtClean="0"/>
-              <a:t>…</a:t>
-            </a:r>
-            <a:endParaRPr lang="en-US" dirty="0" smtClean="0"/>
+              <a:rPr lang="en-US" dirty="0" smtClean="0"/>
+              <a:t>Ring of Fire</a:t>
+            </a:r>
+            <a:endParaRPr lang="en-US" dirty="0"/>
           </a:p>
           <a:p>
             <a:pPr marL="514350" indent="-514350">
               <a:buFont typeface="+mj-lt"/>
               <a:buAutoNum type="arabicPeriod"/>
             </a:pPr>
-            <a:endParaRPr lang="en-US" dirty="0" smtClean="0"/>
-          </a:p>
-          <a:p>
-            <a:pPr marL="514350" indent="-514350">
-              <a:buFont typeface="+mj-lt"/>
-              <a:buAutoNum type="arabicPeriod"/>
-            </a:pPr>
-            <a:endParaRPr lang="en-US" dirty="0" smtClean="0"/>
-          </a:p>
-          <a:p>
-            <a:pPr marL="514350" indent="-514350">
-              <a:buFont typeface="+mj-lt"/>
-              <a:buAutoNum type="arabicPeriod"/>
-            </a:pPr>
-            <a:endParaRPr lang="en-US" dirty="0"/>
-          </a:p>
-        </p:txBody>
-      </p:sp>
-      <p:sp>
-        <p:nvSpPr>
-          <p:cNvPr id="4" name="Content Placeholder 3"/>
-          <p:cNvSpPr>
-            <a:spLocks noGrp="1"/>
-          </p:cNvSpPr>
-          <p:nvPr>
-            <p:ph sz="half" idx="2"/>
-          </p:nvPr>
-        </p:nvSpPr>
-        <p:spPr/>
-        <p:txBody>
-          <a:bodyPr/>
-          <a:lstStyle/>
-          <a:p>
-            <a:endParaRPr lang="en-US"/>
+            <a:r>
+              <a:rPr lang="en-US" dirty="0" smtClean="0"/>
+              <a:t>Attack Sounds:</a:t>
+            </a:r>
+          </a:p>
+          <a:p>
+            <a:pPr marL="971550" lvl="1" indent="-514350">
+              <a:buFont typeface="+mj-lt"/>
+              <a:buAutoNum type="arabicPeriod"/>
+            </a:pPr>
+            <a:r>
+              <a:rPr lang="en-US" dirty="0" smtClean="0"/>
+              <a:t>Giant Skeleton Boss (3 Attacks)</a:t>
+            </a:r>
+          </a:p>
+          <a:p>
+            <a:pPr marL="971550" lvl="1" indent="-514350">
+              <a:buFont typeface="+mj-lt"/>
+              <a:buAutoNum type="arabicPeriod"/>
+            </a:pPr>
+            <a:r>
+              <a:rPr lang="en-US" dirty="0" smtClean="0"/>
+              <a:t>Animated Golem (Throw and Impact)</a:t>
+            </a:r>
+          </a:p>
+          <a:p>
+            <a:pPr marL="971550" lvl="1" indent="-514350">
+              <a:buFont typeface="+mj-lt"/>
+              <a:buAutoNum type="arabicPeriod"/>
+            </a:pPr>
+            <a:r>
+              <a:rPr lang="en-US" dirty="0" smtClean="0"/>
+              <a:t>The Librarian Boss (3 Attacks)</a:t>
+            </a:r>
+          </a:p>
+          <a:p>
+            <a:pPr marL="971550" lvl="1" indent="-514350">
+              <a:buFont typeface="+mj-lt"/>
+              <a:buAutoNum type="arabicPeriod"/>
+            </a:pPr>
+            <a:r>
+              <a:rPr lang="en-US" dirty="0" smtClean="0"/>
+              <a:t>Pyromaniac</a:t>
+            </a:r>
+          </a:p>
+          <a:p>
+            <a:pPr marL="971550" lvl="1" indent="-514350">
+              <a:buFont typeface="+mj-lt"/>
+              <a:buAutoNum type="arabicPeriod"/>
+            </a:pPr>
+            <a:r>
+              <a:rPr lang="en-US" dirty="0" smtClean="0"/>
+              <a:t>Flaming Ghost</a:t>
+            </a:r>
+          </a:p>
+          <a:p>
+            <a:pPr marL="971550" lvl="1" indent="-514350">
+              <a:buFont typeface="+mj-lt"/>
+              <a:buAutoNum type="arabicPeriod"/>
+            </a:pPr>
+            <a:r>
+              <a:rPr lang="en-US" dirty="0" smtClean="0"/>
+              <a:t>The Dragon Boss (3 Attacks)</a:t>
+            </a:r>
+          </a:p>
+          <a:p>
+            <a:pPr marL="971550" lvl="1" indent="-514350">
+              <a:buFont typeface="+mj-lt"/>
+              <a:buAutoNum type="arabicPeriod"/>
+            </a:pPr>
+            <a:r>
+              <a:rPr lang="en-US" dirty="0" smtClean="0"/>
+              <a:t>The Three Knights Boss (3+? </a:t>
+            </a:r>
+            <a:r>
+              <a:rPr lang="en-US" dirty="0" smtClean="0"/>
+              <a:t>Attacks)</a:t>
+            </a:r>
+            <a:endParaRPr lang="en-US" dirty="0"/>
           </a:p>
         </p:txBody>
       </p:sp>

</xml_diff>

<commit_message>
Making progress fixing the presentation
</commit_message>
<xml_diff>
--- a/Documentation/PresentationAlpha.pptx
+++ b/Documentation/PresentationAlpha.pptx
@@ -3108,18 +3108,28 @@
         <p:spPr/>
         <p:txBody>
           <a:bodyPr>
-            <a:normAutofit fontScale="85000" lnSpcReduction="20000"/>
+            <a:normAutofit/>
           </a:bodyPr>
           <a:lstStyle/>
           <a:p>
+            <a:pPr marL="0" indent="0">
+              <a:buNone/>
+            </a:pPr>
+            <a:r>
+              <a:rPr lang="en-US" dirty="0" smtClean="0"/>
+              <a:t>Movement And Hurt Sound Effects</a:t>
+            </a:r>
+          </a:p>
+          <a:p>
             <a:pPr marL="514350" indent="-514350">
               <a:buFont typeface="+mj-lt"/>
               <a:buAutoNum type="arabicPeriod"/>
             </a:pPr>
             <a:r>
-              <a:rPr lang="en-US" dirty="0"/>
-              <a:t>Player Walk</a:t>
-            </a:r>
+              <a:rPr lang="en-US" dirty="0" smtClean="0"/>
+              <a:t>Player Movement Sound Effects</a:t>
+            </a:r>
+            <a:endParaRPr lang="en-US" dirty="0"/>
           </a:p>
           <a:p>
             <a:pPr marL="514350" indent="-514350">
@@ -3127,8 +3137,12 @@
               <a:buAutoNum type="arabicPeriod"/>
             </a:pPr>
             <a:r>
-              <a:rPr lang="en-US" dirty="0"/>
-              <a:t>Player Fade Enter</a:t>
+              <a:rPr lang="en-US" dirty="0" smtClean="0"/>
+              <a:t>Death </a:t>
+            </a:r>
+            <a:r>
+              <a:rPr lang="en-US" dirty="0" smtClean="0"/>
+              <a:t>Sound Effects</a:t>
             </a:r>
           </a:p>
           <a:p>
@@ -3137,8 +3151,8 @@
               <a:buAutoNum type="arabicPeriod"/>
             </a:pPr>
             <a:r>
-              <a:rPr lang="en-US" dirty="0"/>
-              <a:t>Player Fade Exit</a:t>
+              <a:rPr lang="en-US" dirty="0" smtClean="0"/>
+              <a:t>Unique Hurt Sound Effects</a:t>
             </a:r>
           </a:p>
           <a:p>
@@ -3146,250 +3160,68 @@
               <a:buFont typeface="+mj-lt"/>
               <a:buAutoNum type="arabicPeriod"/>
             </a:pPr>
-            <a:r>
-              <a:rPr lang="en-US" dirty="0" smtClean="0"/>
-              <a:t>Death Sounds For Everything (Except Skeleton)</a:t>
-            </a:r>
+            <a:endParaRPr lang="en-US" dirty="0" smtClean="0"/>
           </a:p>
           <a:p>
             <a:pPr marL="514350" indent="-514350">
               <a:buFont typeface="+mj-lt"/>
               <a:buAutoNum type="arabicPeriod"/>
             </a:pPr>
-            <a:r>
-              <a:rPr lang="en-US" dirty="0" smtClean="0"/>
-              <a:t>Unique Hurt Sounds:</a:t>
-            </a:r>
-          </a:p>
-          <a:p>
-            <a:pPr marL="971550" lvl="1" indent="-514350">
-              <a:buFont typeface="+mj-lt"/>
-              <a:buAutoNum type="arabicPeriod"/>
-            </a:pPr>
-            <a:r>
-              <a:rPr lang="en-US" dirty="0" smtClean="0"/>
-              <a:t>Ghost</a:t>
-            </a:r>
-          </a:p>
-          <a:p>
-            <a:pPr marL="971550" lvl="1" indent="-514350">
-              <a:buFont typeface="+mj-lt"/>
-              <a:buAutoNum type="arabicPeriod"/>
-            </a:pPr>
-            <a:r>
-              <a:rPr lang="en-US" dirty="0" smtClean="0"/>
-              <a:t>Staff Ogre</a:t>
-            </a:r>
-          </a:p>
-          <a:p>
-            <a:pPr marL="971550" lvl="1" indent="-514350">
-              <a:buFont typeface="+mj-lt"/>
-              <a:buAutoNum type="arabicPeriod"/>
-            </a:pPr>
-            <a:r>
-              <a:rPr lang="en-US" dirty="0" smtClean="0"/>
-              <a:t>Animated Golem</a:t>
-            </a:r>
-          </a:p>
-          <a:p>
-            <a:pPr marL="971550" lvl="1" indent="-514350">
-              <a:buFont typeface="+mj-lt"/>
-              <a:buAutoNum type="arabicPeriod"/>
-            </a:pPr>
-            <a:r>
-              <a:rPr lang="en-US" dirty="0" smtClean="0"/>
-              <a:t>The Librarian Boss</a:t>
-            </a:r>
-          </a:p>
-          <a:p>
-            <a:pPr marL="971550" lvl="1" indent="-514350">
-              <a:buFont typeface="+mj-lt"/>
-              <a:buAutoNum type="arabicPeriod"/>
-            </a:pPr>
-            <a:r>
-              <a:rPr lang="en-US" dirty="0" smtClean="0"/>
-              <a:t>Flaming Totem</a:t>
-            </a:r>
-          </a:p>
-          <a:p>
-            <a:pPr marL="971550" lvl="1" indent="-514350">
-              <a:buFont typeface="+mj-lt"/>
-              <a:buAutoNum type="arabicPeriod"/>
-            </a:pPr>
-            <a:r>
-              <a:rPr lang="en-US" dirty="0" smtClean="0"/>
-              <a:t>The Dragon Boss</a:t>
-            </a:r>
-          </a:p>
-          <a:p>
-            <a:pPr marL="971550" lvl="1" indent="-514350">
-              <a:buFont typeface="+mj-lt"/>
-              <a:buAutoNum type="arabicPeriod"/>
-            </a:pPr>
-            <a:r>
-              <a:rPr lang="en-US" dirty="0" smtClean="0"/>
-              <a:t>Each Knight of The Three Knights Boss</a:t>
-            </a:r>
+            <a:endParaRPr lang="en-US" dirty="0" smtClean="0"/>
           </a:p>
           <a:p>
             <a:pPr marL="514350" indent="-514350">
               <a:buFont typeface="+mj-lt"/>
               <a:buAutoNum type="arabicPeriod"/>
             </a:pPr>
-            <a:endParaRPr lang="en-US" dirty="0" smtClean="0"/>
+            <a:endParaRPr lang="en-US" dirty="0"/>
+          </a:p>
+        </p:txBody>
+      </p:sp>
+      <p:sp>
+        <p:nvSpPr>
+          <p:cNvPr id="4" name="Content Placeholder 3"/>
+          <p:cNvSpPr>
+            <a:spLocks noGrp="1"/>
+          </p:cNvSpPr>
+          <p:nvPr>
+            <p:ph sz="half" idx="2"/>
+          </p:nvPr>
+        </p:nvSpPr>
+        <p:spPr/>
+        <p:txBody>
+          <a:bodyPr>
+            <a:normAutofit/>
+          </a:bodyPr>
+          <a:lstStyle/>
+          <a:p>
+            <a:pPr marL="0" indent="0">
+              <a:buNone/>
+            </a:pPr>
+            <a:r>
+              <a:rPr lang="en-US" dirty="0" smtClean="0"/>
+              <a:t>Attack Sound Effects</a:t>
+            </a:r>
           </a:p>
           <a:p>
             <a:pPr marL="514350" indent="-514350">
               <a:buFont typeface="+mj-lt"/>
               <a:buAutoNum type="arabicPeriod"/>
             </a:pPr>
-            <a:endParaRPr lang="en-US" dirty="0" smtClean="0"/>
+            <a:r>
+              <a:rPr lang="en-US" dirty="0" smtClean="0"/>
+              <a:t>Player Spell Sound Effects</a:t>
+            </a:r>
+            <a:endParaRPr lang="en-US" dirty="0"/>
           </a:p>
           <a:p>
             <a:pPr marL="514350" indent="-514350">
               <a:buFont typeface="+mj-lt"/>
               <a:buAutoNum type="arabicPeriod"/>
             </a:pPr>
-            <a:endParaRPr lang="en-US" dirty="0" smtClean="0"/>
-          </a:p>
-          <a:p>
-            <a:pPr marL="514350" indent="-514350">
-              <a:buFont typeface="+mj-lt"/>
-              <a:buAutoNum type="arabicPeriod"/>
-            </a:pPr>
-            <a:endParaRPr lang="en-US" dirty="0"/>
-          </a:p>
-        </p:txBody>
-      </p:sp>
-      <p:sp>
-        <p:nvSpPr>
-          <p:cNvPr id="4" name="Content Placeholder 3"/>
-          <p:cNvSpPr>
-            <a:spLocks noGrp="1"/>
-          </p:cNvSpPr>
-          <p:nvPr>
-            <p:ph sz="half" idx="2"/>
-          </p:nvPr>
-        </p:nvSpPr>
-        <p:spPr/>
-        <p:txBody>
-          <a:bodyPr>
-            <a:normAutofit fontScale="85000" lnSpcReduction="20000"/>
-          </a:bodyPr>
-          <a:lstStyle/>
-          <a:p>
-            <a:pPr marL="514350" indent="-514350">
-              <a:buFont typeface="+mj-lt"/>
-              <a:buAutoNum type="arabicPeriod"/>
-            </a:pPr>
-            <a:r>
-              <a:rPr lang="en-US" dirty="0"/>
-              <a:t>Arc Lightning</a:t>
-            </a:r>
-          </a:p>
-          <a:p>
-            <a:pPr marL="514350" indent="-514350">
-              <a:buFont typeface="+mj-lt"/>
-              <a:buAutoNum type="arabicPeriod"/>
-            </a:pPr>
-            <a:r>
-              <a:rPr lang="en-US" dirty="0"/>
-              <a:t>Acid </a:t>
-            </a:r>
-            <a:r>
-              <a:rPr lang="en-US" dirty="0" smtClean="0"/>
-              <a:t>Pool</a:t>
-            </a:r>
-          </a:p>
-          <a:p>
-            <a:pPr marL="514350" indent="-514350">
-              <a:buFont typeface="+mj-lt"/>
-              <a:buAutoNum type="arabicPeriod"/>
-            </a:pPr>
-            <a:r>
-              <a:rPr lang="en-US" dirty="0" smtClean="0"/>
-              <a:t>Ring of Fire</a:t>
-            </a:r>
-            <a:endParaRPr lang="en-US" dirty="0"/>
-          </a:p>
-          <a:p>
-            <a:pPr marL="514350" indent="-514350">
-              <a:buFont typeface="+mj-lt"/>
-              <a:buAutoNum type="arabicPeriod"/>
-            </a:pPr>
-            <a:r>
-              <a:rPr lang="en-US" dirty="0" smtClean="0"/>
-              <a:t>Attack Sounds:</a:t>
-            </a:r>
-          </a:p>
-          <a:p>
-            <a:pPr marL="971550" lvl="1" indent="-514350">
-              <a:buFont typeface="+mj-lt"/>
-              <a:buAutoNum type="arabicPeriod"/>
-            </a:pPr>
-            <a:r>
-              <a:rPr lang="en-US" dirty="0" smtClean="0"/>
-              <a:t>Giant Skeleton Boss (3 Attacks)</a:t>
-            </a:r>
-          </a:p>
-          <a:p>
-            <a:pPr marL="971550" lvl="1" indent="-514350">
-              <a:buFont typeface="+mj-lt"/>
-              <a:buAutoNum type="arabicPeriod"/>
-            </a:pPr>
-            <a:r>
-              <a:rPr lang="en-US" dirty="0" smtClean="0"/>
-              <a:t>Animated Golem (Throw and Impact)</a:t>
-            </a:r>
-          </a:p>
-          <a:p>
-            <a:pPr marL="971550" lvl="1" indent="-514350">
-              <a:buFont typeface="+mj-lt"/>
-              <a:buAutoNum type="arabicPeriod"/>
-            </a:pPr>
-            <a:r>
-              <a:rPr lang="en-US" dirty="0" smtClean="0"/>
-              <a:t>The Librarian Boss (3 Attacks)</a:t>
-            </a:r>
-          </a:p>
-          <a:p>
-            <a:pPr marL="971550" lvl="1" indent="-514350">
-              <a:buFont typeface="+mj-lt"/>
-              <a:buAutoNum type="arabicPeriod"/>
-            </a:pPr>
-            <a:r>
-              <a:rPr lang="en-US" dirty="0" smtClean="0"/>
-              <a:t>Pyromaniac</a:t>
-            </a:r>
-          </a:p>
-          <a:p>
-            <a:pPr marL="971550" lvl="1" indent="-514350">
-              <a:buFont typeface="+mj-lt"/>
-              <a:buAutoNum type="arabicPeriod"/>
-            </a:pPr>
-            <a:r>
-              <a:rPr lang="en-US" dirty="0" smtClean="0"/>
-              <a:t>Flaming Ghost</a:t>
-            </a:r>
-          </a:p>
-          <a:p>
-            <a:pPr marL="971550" lvl="1" indent="-514350">
-              <a:buFont typeface="+mj-lt"/>
-              <a:buAutoNum type="arabicPeriod"/>
-            </a:pPr>
-            <a:r>
-              <a:rPr lang="en-US" dirty="0" smtClean="0"/>
-              <a:t>The Dragon Boss (3 Attacks)</a:t>
-            </a:r>
-          </a:p>
-          <a:p>
-            <a:pPr marL="971550" lvl="1" indent="-514350">
-              <a:buFont typeface="+mj-lt"/>
-              <a:buAutoNum type="arabicPeriod"/>
-            </a:pPr>
-            <a:r>
-              <a:rPr lang="en-US" dirty="0" smtClean="0"/>
-              <a:t>The Three Knights Boss (3+? Attacks)</a:t>
+            <a:r>
+              <a:rPr lang="en-US" dirty="0" smtClean="0"/>
+              <a:t>Enemy Attack Sound Effects</a:t>
             </a:r>
             <a:endParaRPr lang="en-US" dirty="0"/>
           </a:p>
@@ -3686,13 +3518,6 @@
               </a:rPr>
               <a:t>Room Generation</a:t>
             </a:r>
-            <a:endParaRPr lang="en-US" sz="2000" dirty="0" smtClean="0">
-              <a:solidFill>
-                <a:srgbClr val="FFFF00"/>
-              </a:solidFill>
-              <a:latin typeface="Times New Roman" panose="02020603050405020304" pitchFamily="18" charset="0"/>
-              <a:cs typeface="Times New Roman" panose="02020603050405020304" pitchFamily="18" charset="0"/>
-            </a:endParaRPr>
           </a:p>
           <a:p>
             <a:pPr marL="514350" indent="-514350">
@@ -3723,27 +3548,7 @@
                 <a:latin typeface="Times New Roman" panose="02020603050405020304" pitchFamily="18" charset="0"/>
                 <a:cs typeface="Times New Roman" panose="02020603050405020304" pitchFamily="18" charset="0"/>
               </a:rPr>
-              <a:t>New </a:t>
-            </a:r>
-            <a:r>
-              <a:rPr lang="en-US" sz="2000" dirty="0" smtClean="0">
-                <a:solidFill>
-                  <a:srgbClr val="FFFF00"/>
-                </a:solidFill>
-                <a:latin typeface="Times New Roman" panose="02020603050405020304" pitchFamily="18" charset="0"/>
-                <a:cs typeface="Times New Roman" panose="02020603050405020304" pitchFamily="18" charset="0"/>
-              </a:rPr>
-              <a:t>Firing Patterns &amp; </a:t>
-            </a:r>
-            <a:r>
-              <a:rPr lang="en-US" sz="2000" dirty="0" smtClean="0">
-                <a:solidFill>
-                  <a:srgbClr val="FFFF00"/>
-                </a:solidFill>
-                <a:latin typeface="Times New Roman" panose="02020603050405020304" pitchFamily="18" charset="0"/>
-                <a:cs typeface="Times New Roman" panose="02020603050405020304" pitchFamily="18" charset="0"/>
-              </a:rPr>
-              <a:t>Mechanics</a:t>
+              <a:t>New Firing Patterns &amp; Mechanics</a:t>
             </a:r>
           </a:p>
           <a:p>
@@ -3761,13 +3566,6 @@
               </a:rPr>
               <a:t>Bosses</a:t>
             </a:r>
-            <a:endParaRPr lang="en-US" sz="2000" dirty="0" smtClean="0">
-              <a:solidFill>
-                <a:srgbClr val="FFFF00"/>
-              </a:solidFill>
-              <a:latin typeface="Times New Roman" panose="02020603050405020304" pitchFamily="18" charset="0"/>
-              <a:cs typeface="Times New Roman" panose="02020603050405020304" pitchFamily="18" charset="0"/>
-            </a:endParaRPr>
           </a:p>
           <a:p>
             <a:pPr marL="514350" indent="-514350">
@@ -3946,13 +3744,6 @@
               </a:rPr>
               <a:t>9. Animations / SFX</a:t>
             </a:r>
-            <a:endParaRPr lang="en-US" sz="2000" dirty="0" smtClean="0">
-              <a:solidFill>
-                <a:srgbClr val="FFFF00"/>
-              </a:solidFill>
-              <a:latin typeface="Times New Roman" panose="02020603050405020304" pitchFamily="18" charset="0"/>
-              <a:cs typeface="Times New Roman" panose="02020603050405020304" pitchFamily="18" charset="0"/>
-            </a:endParaRPr>
           </a:p>
           <a:p>
             <a:endParaRPr lang="en-US" dirty="0"/>
@@ -4386,13 +4177,20 @@
         </p:nvSpPr>
         <p:spPr/>
         <p:txBody>
-          <a:bodyPr/>
+          <a:bodyPr>
+            <a:normAutofit/>
+          </a:bodyPr>
           <a:lstStyle/>
           <a:p>
             <a:r>
               <a:rPr lang="en-US" dirty="0"/>
-              <a:t>New Art Assets</a:t>
-            </a:r>
+              <a:t>New Art </a:t>
+            </a:r>
+            <a:r>
+              <a:rPr lang="en-US" dirty="0" smtClean="0"/>
+              <a:t>Assets</a:t>
+            </a:r>
+            <a:endParaRPr lang="en-US" dirty="0"/>
           </a:p>
         </p:txBody>
       </p:sp>
@@ -4895,13 +4693,16 @@
           </a:bodyPr>
           <a:lstStyle/>
           <a:p>
-            <a:pPr marL="514350" indent="-514350">
-              <a:buFont typeface="+mj-lt"/>
-              <a:buAutoNum type="arabicPeriod"/>
-            </a:pPr>
-            <a:r>
-              <a:rPr lang="en-US" dirty="0" smtClean="0"/>
-              <a:t>Add enemies:</a:t>
+            <a:pPr marL="0" indent="0">
+              <a:buNone/>
+            </a:pPr>
+            <a:r>
+              <a:rPr lang="en-US" dirty="0"/>
+              <a:t>E</a:t>
+            </a:r>
+            <a:r>
+              <a:rPr lang="en-US" dirty="0" smtClean="0"/>
+              <a:t>nemies:</a:t>
             </a:r>
           </a:p>
           <a:p>
@@ -4911,7 +4712,7 @@
             </a:pPr>
             <a:r>
               <a:rPr lang="en-US" dirty="0" smtClean="0"/>
-              <a:t>Ghost</a:t>
+              <a:t>Area 3 Enemies</a:t>
             </a:r>
           </a:p>
           <a:p>
@@ -4921,7 +4722,7 @@
             </a:pPr>
             <a:r>
               <a:rPr lang="en-US" dirty="0" smtClean="0"/>
-              <a:t>Pyromaniac</a:t>
+              <a:t>Area 2 Boss</a:t>
             </a:r>
           </a:p>
           <a:p>
@@ -4931,7 +4732,7 @@
             </a:pPr>
             <a:r>
               <a:rPr lang="en-US" dirty="0" smtClean="0"/>
-              <a:t>Fireling</a:t>
+              <a:t>Area 3 Boss</a:t>
             </a:r>
           </a:p>
           <a:p>
@@ -4941,47 +4742,7 @@
             </a:pPr>
             <a:r>
               <a:rPr lang="en-US" dirty="0" smtClean="0"/>
-              <a:t>Flaming Totem</a:t>
-            </a:r>
-          </a:p>
-          <a:p>
-            <a:pPr marL="971550" lvl="1" indent="-514350">
-              <a:buFont typeface="+mj-lt"/>
-              <a:buAutoNum type="arabicPeriod"/>
-            </a:pPr>
-            <a:r>
-              <a:rPr lang="en-US" dirty="0" smtClean="0"/>
-              <a:t>Flaming Ghost</a:t>
-            </a:r>
-          </a:p>
-          <a:p>
-            <a:pPr marL="971550" lvl="1" indent="-514350">
-              <a:buFont typeface="+mj-lt"/>
-              <a:buAutoNum type="arabicPeriod"/>
-            </a:pPr>
-            <a:r>
-              <a:rPr lang="en-US" dirty="0" smtClean="0"/>
-              <a:t>The Librarian Boss</a:t>
-            </a:r>
-          </a:p>
-          <a:p>
-            <a:pPr marL="971550" lvl="1" indent="-514350">
-              <a:buFont typeface="+mj-lt"/>
-              <a:buAutoNum type="arabicPeriod"/>
-            </a:pPr>
-            <a:r>
-              <a:rPr lang="en-US" dirty="0" smtClean="0"/>
-              <a:t>The Dragon Boss</a:t>
-            </a:r>
-          </a:p>
-          <a:p>
-            <a:pPr marL="971550" lvl="1" indent="-514350">
-              <a:buFont typeface="+mj-lt"/>
-              <a:buAutoNum type="arabicPeriod"/>
-            </a:pPr>
-            <a:r>
-              <a:rPr lang="en-US" dirty="0" smtClean="0"/>
-              <a:t>The Three Knights Boss</a:t>
+              <a:t>Final Boss</a:t>
             </a:r>
           </a:p>
         </p:txBody>
@@ -5003,13 +4764,16 @@
           </a:bodyPr>
           <a:lstStyle/>
           <a:p>
-            <a:pPr marL="514350" indent="-514350">
-              <a:buFont typeface="+mj-lt"/>
-              <a:buAutoNum type="arabicPeriod"/>
-            </a:pPr>
+            <a:pPr marL="0" indent="0">
+              <a:buNone/>
+            </a:pPr>
+            <a:r>
+              <a:rPr lang="en-US" dirty="0" smtClean="0"/>
+              <a:t>Player </a:t>
+            </a:r>
             <a:r>
               <a:rPr lang="en-US" dirty="0"/>
-              <a:t>Add Player Spells:</a:t>
+              <a:t>Spells:</a:t>
             </a:r>
           </a:p>
           <a:p>
@@ -5049,8 +4813,23 @@
             </a:pPr>
             <a:r>
               <a:rPr lang="en-US" dirty="0"/>
-              <a:t>Dragon Scale Stream</a:t>
-            </a:r>
+              <a:t>Dragon Scale </a:t>
+            </a:r>
+            <a:r>
+              <a:rPr lang="en-US" dirty="0" smtClean="0"/>
+              <a:t>Stream</a:t>
+            </a:r>
+          </a:p>
+          <a:p>
+            <a:pPr marL="971550" lvl="1" indent="-514350">
+              <a:buFont typeface="+mj-lt"/>
+              <a:buAutoNum type="arabicPeriod"/>
+            </a:pPr>
+            <a:r>
+              <a:rPr lang="en-US" dirty="0" smtClean="0"/>
+              <a:t>Water Stream</a:t>
+            </a:r>
+            <a:endParaRPr lang="en-US" dirty="0"/>
           </a:p>
           <a:p>
             <a:pPr marL="0" indent="0">
@@ -5163,8 +4942,8 @@
               <a:buAutoNum type="arabicPeriod"/>
             </a:pPr>
             <a:r>
-              <a:rPr lang="en-US" dirty="0"/>
-              <a:t>Ghost Animations</a:t>
+              <a:rPr lang="en-US" dirty="0" smtClean="0"/>
+              <a:t>Enemy Attack Animations</a:t>
             </a:r>
           </a:p>
           <a:p>
@@ -5174,57 +4953,7 @@
             </a:pPr>
             <a:r>
               <a:rPr lang="en-US" dirty="0" smtClean="0"/>
-              <a:t>Apprentice Animations</a:t>
-            </a:r>
-          </a:p>
-          <a:p>
-            <a:pPr marL="514350" indent="-514350">
-              <a:buFont typeface="+mj-lt"/>
-              <a:buAutoNum type="arabicPeriod"/>
-            </a:pPr>
-            <a:r>
-              <a:rPr lang="en-US" dirty="0" smtClean="0"/>
-              <a:t>Staff Ogre Animations</a:t>
-            </a:r>
-          </a:p>
-          <a:p>
-            <a:pPr marL="514350" indent="-514350">
-              <a:buFont typeface="+mj-lt"/>
-              <a:buAutoNum type="arabicPeriod"/>
-            </a:pPr>
-            <a:r>
-              <a:rPr lang="en-US" dirty="0" smtClean="0"/>
-              <a:t>Pyromaniac Animations</a:t>
-            </a:r>
-          </a:p>
-          <a:p>
-            <a:pPr marL="514350" indent="-514350">
-              <a:buFont typeface="+mj-lt"/>
-              <a:buAutoNum type="arabicPeriod"/>
-            </a:pPr>
-            <a:r>
-              <a:rPr lang="en-US" dirty="0" smtClean="0"/>
-              <a:t>Fireling Animations</a:t>
-            </a:r>
-          </a:p>
-          <a:p>
-            <a:pPr marL="514350" indent="-514350">
-              <a:buFont typeface="+mj-lt"/>
-              <a:buAutoNum type="arabicPeriod"/>
-            </a:pPr>
-            <a:r>
-              <a:rPr lang="en-US" dirty="0" smtClean="0"/>
-              <a:t>Flaming Totem Animations</a:t>
-            </a:r>
-          </a:p>
-          <a:p>
-            <a:pPr marL="514350" indent="-514350">
-              <a:buFont typeface="+mj-lt"/>
-              <a:buAutoNum type="arabicPeriod"/>
-            </a:pPr>
-            <a:r>
-              <a:rPr lang="en-US" dirty="0" smtClean="0"/>
-              <a:t>Flaming Ghost Animations (Adapted from Ghost)</a:t>
+              <a:t>Enemy Movement Animations</a:t>
             </a:r>
             <a:endParaRPr lang="en-US" dirty="0"/>
           </a:p>
@@ -5250,7 +4979,7 @@
             </a:pPr>
             <a:r>
               <a:rPr lang="en-US" dirty="0" smtClean="0"/>
-              <a:t>8. Acid Pool Animation</a:t>
+              <a:t>3.   Player Spell Animations</a:t>
             </a:r>
           </a:p>
           <a:p>
@@ -5259,7 +4988,7 @@
             </a:pPr>
             <a:r>
               <a:rPr lang="en-US" dirty="0" smtClean="0"/>
-              <a:t>9. Arc Lightning Animation</a:t>
+              <a:t>4.   Boss Attack Animations</a:t>
             </a:r>
           </a:p>
           <a:p>
@@ -5268,34 +4997,7 @@
             </a:pPr>
             <a:r>
               <a:rPr lang="en-US" dirty="0" smtClean="0"/>
-              <a:t>10. Fire Bullet Animation (For All Flaming Projectiles)</a:t>
-            </a:r>
-          </a:p>
-          <a:p>
-            <a:pPr marL="0" indent="0">
-              <a:buNone/>
-            </a:pPr>
-            <a:r>
-              <a:rPr lang="en-US" dirty="0" smtClean="0"/>
-              <a:t>11. The Librarian Boss Animations</a:t>
-            </a:r>
-          </a:p>
-          <a:p>
-            <a:pPr marL="0" indent="0">
-              <a:buNone/>
-            </a:pPr>
-            <a:r>
-              <a:rPr lang="en-US" dirty="0" smtClean="0"/>
-              <a:t>12. The Dragon Boss Animations</a:t>
-            </a:r>
-          </a:p>
-          <a:p>
-            <a:pPr marL="0" indent="0">
-              <a:buNone/>
-            </a:pPr>
-            <a:r>
-              <a:rPr lang="en-US" dirty="0" smtClean="0"/>
-              <a:t>13. The Three Knights Boss Animations</a:t>
+              <a:t>5.   Boss Movement Animations</a:t>
             </a:r>
             <a:endParaRPr lang="en-US" dirty="0"/>
           </a:p>

</xml_diff>

<commit_message>
Made the Alpha Presentation better
</commit_message>
<xml_diff>
--- a/Documentation/PresentationAlpha.pptx
+++ b/Documentation/PresentationAlpha.pptx
@@ -3138,11 +3138,7 @@
             </a:pPr>
             <a:r>
               <a:rPr lang="en-US" dirty="0" smtClean="0"/>
-              <a:t>Death </a:t>
-            </a:r>
-            <a:r>
-              <a:rPr lang="en-US" dirty="0" smtClean="0"/>
-              <a:t>Sound Effects</a:t>
+              <a:t>Death Sound Effects</a:t>
             </a:r>
           </a:p>
           <a:p>
@@ -3846,7 +3842,7 @@
         <p:spPr/>
         <p:txBody>
           <a:bodyPr>
-            <a:normAutofit fontScale="92500" lnSpcReduction="10000"/>
+            <a:normAutofit/>
           </a:bodyPr>
           <a:lstStyle/>
           <a:p>
@@ -3856,8 +3852,9 @@
             </a:pPr>
             <a:r>
               <a:rPr lang="en-US" dirty="0" smtClean="0"/>
-              <a:t>Added Sound Effects For Player Spells</a:t>
-            </a:r>
+              <a:t>Player Sound Effects</a:t>
+            </a:r>
+            <a:endParaRPr lang="en-US" dirty="0" smtClean="0"/>
           </a:p>
           <a:p>
             <a:pPr marL="971550" lvl="1" indent="-514350">
@@ -3866,108 +3863,19 @@
             </a:pPr>
             <a:r>
               <a:rPr lang="en-US" dirty="0" smtClean="0"/>
-              <a:t>Magic Missile Sound Effect</a:t>
-            </a:r>
-          </a:p>
-          <a:p>
-            <a:pPr marL="914400" lvl="1" indent="-457200">
+              <a:t>Spell Attack Sound Effects</a:t>
+            </a:r>
+          </a:p>
+          <a:p>
+            <a:pPr marL="971550" lvl="1" indent="-514350">
               <a:buFont typeface="+mj-lt"/>
               <a:buAutoNum type="arabicPeriod"/>
             </a:pPr>
             <a:r>
               <a:rPr lang="en-US" dirty="0" smtClean="0"/>
-              <a:t>Bubble Trap Sound Effect</a:t>
-            </a:r>
-          </a:p>
-          <a:p>
-            <a:pPr marL="914400" lvl="1" indent="-457200">
-              <a:buFont typeface="+mj-lt"/>
-              <a:buAutoNum type="arabicPeriod"/>
-            </a:pPr>
-            <a:r>
-              <a:rPr lang="en-US" dirty="0" smtClean="0"/>
-              <a:t>Exploding Bullet Sound Effects</a:t>
-            </a:r>
-          </a:p>
-          <a:p>
-            <a:pPr marL="1371600" lvl="2" indent="-457200">
-              <a:buFont typeface="+mj-lt"/>
-              <a:buAutoNum type="arabicPeriod"/>
-            </a:pPr>
-            <a:r>
-              <a:rPr lang="en-US" dirty="0" smtClean="0"/>
-              <a:t>Exploding Bullet Launch</a:t>
-            </a:r>
-          </a:p>
-          <a:p>
-            <a:pPr marL="1371600" lvl="2" indent="-457200">
-              <a:buFont typeface="+mj-lt"/>
-              <a:buAutoNum type="arabicPeriod"/>
-            </a:pPr>
-            <a:r>
-              <a:rPr lang="en-US" dirty="0" smtClean="0"/>
-              <a:t>Exploding Bullet Impact</a:t>
-            </a:r>
-          </a:p>
-          <a:p>
-            <a:pPr marL="914400" lvl="1" indent="-457200">
-              <a:buFont typeface="+mj-lt"/>
-              <a:buAutoNum type="arabicPeriod"/>
-            </a:pPr>
-            <a:r>
-              <a:rPr lang="en-US" dirty="0" smtClean="0"/>
-              <a:t>Ice Spear Sound Effect</a:t>
-            </a:r>
-          </a:p>
-          <a:p>
-            <a:pPr marL="914400" lvl="1" indent="-457200">
-              <a:buFont typeface="+mj-lt"/>
-              <a:buAutoNum type="arabicPeriod"/>
-            </a:pPr>
-            <a:r>
-              <a:rPr lang="en-US" dirty="0" smtClean="0"/>
-              <a:t>Seeking Arrow Sound Effect</a:t>
-            </a:r>
-          </a:p>
-          <a:p>
-            <a:pPr marL="457200" indent="-457200">
-              <a:buFont typeface="+mj-lt"/>
-              <a:buAutoNum type="arabicPeriod"/>
-            </a:pPr>
-            <a:r>
-              <a:rPr lang="en-US" dirty="0" smtClean="0"/>
-              <a:t>Added Enemy Sound Effects</a:t>
-            </a:r>
-          </a:p>
-          <a:p>
-            <a:pPr marL="914400" lvl="1" indent="-457200">
-              <a:buFont typeface="+mj-lt"/>
-              <a:buAutoNum type="arabicPeriod"/>
-            </a:pPr>
-            <a:r>
-              <a:rPr lang="en-US" dirty="0" smtClean="0"/>
-              <a:t>Enemy Hurt Sound</a:t>
-            </a:r>
-          </a:p>
-          <a:p>
-            <a:pPr marL="914400" lvl="1" indent="-457200">
-              <a:buFont typeface="+mj-lt"/>
-              <a:buAutoNum type="arabicPeriod"/>
-            </a:pPr>
-            <a:r>
-              <a:rPr lang="en-US" dirty="0" smtClean="0"/>
-              <a:t>Enemy Hurt Sound Low Pitch</a:t>
-            </a:r>
-          </a:p>
-          <a:p>
-            <a:pPr marL="914400" lvl="1" indent="-457200">
-              <a:buFont typeface="+mj-lt"/>
-              <a:buAutoNum type="arabicPeriod"/>
-            </a:pPr>
-            <a:r>
-              <a:rPr lang="en-US" dirty="0" smtClean="0"/>
-              <a:t>Skeleton Death Sound</a:t>
-            </a:r>
+              <a:t>Explosion Sound Effect</a:t>
+            </a:r>
+            <a:endParaRPr lang="en-US" dirty="0" smtClean="0"/>
           </a:p>
         </p:txBody>
       </p:sp>
@@ -3997,6 +3905,30 @@
               <a:buFont typeface="+mj-lt"/>
               <a:buAutoNum type="arabicPeriod"/>
             </a:pPr>
+            <a:r>
+              <a:rPr lang="en-US" dirty="0" smtClean="0"/>
+              <a:t>Enemy Sound Effects</a:t>
+            </a:r>
+          </a:p>
+          <a:p>
+            <a:pPr marL="971550" lvl="1" indent="-514350">
+              <a:buFont typeface="+mj-lt"/>
+              <a:buAutoNum type="arabicPeriod"/>
+            </a:pPr>
+            <a:r>
+              <a:rPr lang="en-US" dirty="0" smtClean="0"/>
+              <a:t>Hurt Sounds</a:t>
+            </a:r>
+          </a:p>
+          <a:p>
+            <a:pPr marL="971550" lvl="1" indent="-514350">
+              <a:buFont typeface="+mj-lt"/>
+              <a:buAutoNum type="arabicPeriod"/>
+            </a:pPr>
+            <a:r>
+              <a:rPr lang="en-US" dirty="0" smtClean="0"/>
+              <a:t>Death Sounds</a:t>
+            </a:r>
             <a:endParaRPr lang="en-US" dirty="0" smtClean="0"/>
           </a:p>
           <a:p>
@@ -4207,7 +4139,7 @@
         <p:spPr/>
         <p:txBody>
           <a:bodyPr>
-            <a:normAutofit fontScale="92500" lnSpcReduction="20000"/>
+            <a:normAutofit/>
           </a:bodyPr>
           <a:lstStyle/>
           <a:p>
@@ -4217,17 +4149,8 @@
             </a:pPr>
             <a:r>
               <a:rPr lang="en-US" dirty="0" smtClean="0"/>
-              <a:t>Added </a:t>
-            </a:r>
-            <a:r>
-              <a:rPr lang="en-US" dirty="0"/>
-              <a:t>Giant </a:t>
-            </a:r>
-            <a:r>
-              <a:rPr lang="en-US" dirty="0" smtClean="0"/>
-              <a:t>Skeleton Animations</a:t>
-            </a:r>
-            <a:endParaRPr lang="en-US" dirty="0"/>
+              <a:t>Player Assets</a:t>
+            </a:r>
           </a:p>
           <a:p>
             <a:pPr marL="971550" lvl="1" indent="-514350">
@@ -4235,8 +4158,8 @@
               <a:buAutoNum type="arabicPeriod"/>
             </a:pPr>
             <a:r>
-              <a:rPr lang="en-US" dirty="0"/>
-              <a:t>Big Blast Animation</a:t>
+              <a:rPr lang="en-US" dirty="0" smtClean="0"/>
+              <a:t>Walking Animations</a:t>
             </a:r>
           </a:p>
           <a:p>
@@ -4245,8 +4168,8 @@
               <a:buAutoNum type="arabicPeriod"/>
             </a:pPr>
             <a:r>
-              <a:rPr lang="en-US" dirty="0"/>
-              <a:t>Bone Throw Animation</a:t>
+              <a:rPr lang="en-US" dirty="0" smtClean="0"/>
+              <a:t>Spell Attack Animations</a:t>
             </a:r>
           </a:p>
           <a:p>
@@ -4255,9 +4178,16 @@
               <a:buAutoNum type="arabicPeriod"/>
             </a:pPr>
             <a:r>
-              <a:rPr lang="en-US" dirty="0"/>
-              <a:t>Stomp Animation</a:t>
-            </a:r>
+              <a:rPr lang="en-US" dirty="0" smtClean="0"/>
+              <a:t>Spell Textures</a:t>
+            </a:r>
+          </a:p>
+          <a:p>
+            <a:pPr marL="971550" lvl="1" indent="-514350">
+              <a:buFont typeface="+mj-lt"/>
+              <a:buAutoNum type="arabicPeriod"/>
+            </a:pPr>
+            <a:endParaRPr lang="en-US" dirty="0"/>
           </a:p>
           <a:p>
             <a:pPr marL="514350" indent="-514350">
@@ -4265,8 +4195,8 @@
               <a:buAutoNum type="arabicPeriod"/>
             </a:pPr>
             <a:r>
-              <a:rPr lang="en-US" dirty="0"/>
-              <a:t>Enemy Animations</a:t>
+              <a:rPr lang="en-US" dirty="0" smtClean="0"/>
+              <a:t>Map Assets</a:t>
             </a:r>
           </a:p>
           <a:p>
@@ -4275,8 +4205,8 @@
               <a:buAutoNum type="arabicPeriod"/>
             </a:pPr>
             <a:r>
-              <a:rPr lang="en-US" dirty="0"/>
-              <a:t>Golem Walk </a:t>
+              <a:rPr lang="en-US" dirty="0" smtClean="0"/>
+              <a:t>Area 1 Tiles</a:t>
             </a:r>
           </a:p>
           <a:p>
@@ -4285,8 +4215,43 @@
               <a:buAutoNum type="arabicPeriod"/>
             </a:pPr>
             <a:r>
-              <a:rPr lang="en-US" dirty="0"/>
-              <a:t>Necromancer Attack &amp; Walk</a:t>
+              <a:rPr lang="en-US" dirty="0" smtClean="0"/>
+              <a:t>Area 2 Tiles</a:t>
+            </a:r>
+            <a:endParaRPr lang="en-US" dirty="0" smtClean="0"/>
+          </a:p>
+          <a:p>
+            <a:pPr marL="0" indent="0">
+              <a:buNone/>
+            </a:pPr>
+            <a:endParaRPr lang="en-US" dirty="0"/>
+          </a:p>
+        </p:txBody>
+      </p:sp>
+      <p:sp>
+        <p:nvSpPr>
+          <p:cNvPr id="9" name="Content Placeholder 8"/>
+          <p:cNvSpPr>
+            <a:spLocks noGrp="1"/>
+          </p:cNvSpPr>
+          <p:nvPr>
+            <p:ph sz="half" idx="2"/>
+          </p:nvPr>
+        </p:nvSpPr>
+        <p:spPr/>
+        <p:txBody>
+          <a:bodyPr>
+            <a:normAutofit/>
+          </a:bodyPr>
+          <a:lstStyle/>
+          <a:p>
+            <a:pPr marL="514350" indent="-514350">
+              <a:buFont typeface="+mj-lt"/>
+              <a:buAutoNum type="arabicPeriod"/>
+            </a:pPr>
+            <a:r>
+              <a:rPr lang="en-US" dirty="0" smtClean="0"/>
+              <a:t>Enemy Assets</a:t>
             </a:r>
           </a:p>
           <a:p>
@@ -4295,12 +4260,8 @@
               <a:buAutoNum type="arabicPeriod"/>
             </a:pPr>
             <a:r>
-              <a:rPr lang="en-US" dirty="0"/>
-              <a:t>Skeleton </a:t>
-            </a:r>
-            <a:r>
               <a:rPr lang="en-US" dirty="0" smtClean="0"/>
-              <a:t>Walk</a:t>
+              <a:t>Enemy Walking Animations</a:t>
             </a:r>
           </a:p>
           <a:p>
@@ -4310,67 +4271,7 @@
             </a:pPr>
             <a:r>
               <a:rPr lang="en-US" dirty="0" smtClean="0"/>
-              <a:t>Zombie Walk</a:t>
-            </a:r>
-            <a:endParaRPr lang="en-US" dirty="0"/>
-          </a:p>
-          <a:p>
-            <a:pPr marL="514350" indent="-514350">
-              <a:buFont typeface="+mj-lt"/>
-              <a:buAutoNum type="arabicPeriod"/>
-            </a:pPr>
-            <a:r>
-              <a:rPr lang="en-US" dirty="0"/>
-              <a:t>Seeking Spell </a:t>
-            </a:r>
-            <a:r>
-              <a:rPr lang="en-US" dirty="0" smtClean="0"/>
-              <a:t>Animation</a:t>
-            </a:r>
-          </a:p>
-          <a:p>
-            <a:pPr marL="514350" indent="-514350">
-              <a:buFont typeface="+mj-lt"/>
-              <a:buAutoNum type="arabicPeriod"/>
-            </a:pPr>
-            <a:r>
-              <a:rPr lang="en-US" dirty="0" smtClean="0"/>
-              <a:t>Wand Man Walk Animations</a:t>
-            </a:r>
-            <a:endParaRPr lang="en-US" dirty="0"/>
-          </a:p>
-          <a:p>
-            <a:pPr marL="0" indent="0">
-              <a:buNone/>
-            </a:pPr>
-            <a:endParaRPr lang="en-US" dirty="0"/>
-          </a:p>
-        </p:txBody>
-      </p:sp>
-      <p:sp>
-        <p:nvSpPr>
-          <p:cNvPr id="9" name="Content Placeholder 8"/>
-          <p:cNvSpPr>
-            <a:spLocks noGrp="1"/>
-          </p:cNvSpPr>
-          <p:nvPr>
-            <p:ph sz="half" idx="2"/>
-          </p:nvPr>
-        </p:nvSpPr>
-        <p:spPr/>
-        <p:txBody>
-          <a:bodyPr>
-            <a:normAutofit fontScale="92500" lnSpcReduction="20000"/>
-          </a:bodyPr>
-          <a:lstStyle/>
-          <a:p>
-            <a:pPr marL="514350" indent="-514350">
-              <a:buFont typeface="+mj-lt"/>
-              <a:buAutoNum type="arabicPeriod"/>
-            </a:pPr>
-            <a:r>
-              <a:rPr lang="en-US" dirty="0"/>
-              <a:t>Added Tile Textures</a:t>
+              <a:t>Enemy Attacking Animations</a:t>
             </a:r>
           </a:p>
           <a:p>
@@ -4379,110 +4280,8 @@
               <a:buAutoNum type="arabicPeriod"/>
             </a:pPr>
             <a:r>
-              <a:rPr lang="en-US" dirty="0"/>
-              <a:t>Wooden Library Floor Tike</a:t>
-            </a:r>
-          </a:p>
-          <a:p>
-            <a:pPr marL="971550" lvl="1" indent="-514350">
-              <a:buFont typeface="+mj-lt"/>
-              <a:buAutoNum type="arabicPeriod"/>
-            </a:pPr>
-            <a:r>
-              <a:rPr lang="en-US" dirty="0"/>
-              <a:t>Crate Tile</a:t>
-            </a:r>
-          </a:p>
-          <a:p>
-            <a:pPr marL="971550" lvl="1" indent="-514350">
-              <a:buFont typeface="+mj-lt"/>
-              <a:buAutoNum type="arabicPeriod"/>
-            </a:pPr>
-            <a:r>
-              <a:rPr lang="en-US" dirty="0"/>
-              <a:t>Skull Tile</a:t>
-            </a:r>
-          </a:p>
-          <a:p>
-            <a:pPr marL="971550" lvl="1" indent="-514350">
-              <a:buFont typeface="+mj-lt"/>
-              <a:buAutoNum type="arabicPeriod"/>
-            </a:pPr>
-            <a:r>
-              <a:rPr lang="en-US" dirty="0"/>
-              <a:t>Gravestone </a:t>
-            </a:r>
-            <a:r>
               <a:rPr lang="en-US" dirty="0" smtClean="0"/>
-              <a:t>Tile</a:t>
-            </a:r>
-          </a:p>
-          <a:p>
-            <a:pPr marL="514350" indent="-514350">
-              <a:buFont typeface="+mj-lt"/>
-              <a:buAutoNum type="arabicPeriod"/>
-            </a:pPr>
-            <a:r>
-              <a:rPr lang="en-US" dirty="0" smtClean="0"/>
-              <a:t>Added Seeking </a:t>
-            </a:r>
-            <a:r>
-              <a:rPr lang="en-US" dirty="0"/>
-              <a:t>Arrow </a:t>
-            </a:r>
-            <a:r>
-              <a:rPr lang="en-US" dirty="0" smtClean="0"/>
-              <a:t>Texture</a:t>
-            </a:r>
-          </a:p>
-          <a:p>
-            <a:pPr marL="514350" indent="-514350">
-              <a:buFont typeface="+mj-lt"/>
-              <a:buAutoNum type="arabicPeriod"/>
-            </a:pPr>
-            <a:r>
-              <a:rPr lang="en-US" dirty="0" smtClean="0"/>
-              <a:t>Added Spell Scroll Texture</a:t>
-            </a:r>
-          </a:p>
-          <a:p>
-            <a:pPr marL="514350" indent="-514350">
-              <a:buFont typeface="+mj-lt"/>
-              <a:buAutoNum type="arabicPeriod"/>
-            </a:pPr>
-            <a:r>
-              <a:rPr lang="en-US" dirty="0" smtClean="0"/>
-              <a:t>Added Big Burger Texture</a:t>
-            </a:r>
-          </a:p>
-          <a:p>
-            <a:pPr marL="514350" indent="-514350">
-              <a:buFont typeface="+mj-lt"/>
-              <a:buAutoNum type="arabicPeriod"/>
-            </a:pPr>
-            <a:r>
-              <a:rPr lang="en-US" dirty="0" smtClean="0"/>
-              <a:t>Added Bone Texture</a:t>
-            </a:r>
-          </a:p>
-          <a:p>
-            <a:pPr marL="514350" indent="-514350">
-              <a:buFont typeface="+mj-lt"/>
-              <a:buAutoNum type="arabicPeriod"/>
-            </a:pPr>
-            <a:r>
-              <a:rPr lang="en-US" dirty="0" smtClean="0"/>
-              <a:t>Added Pile Of Bones Texture</a:t>
-            </a:r>
-          </a:p>
-          <a:p>
-            <a:pPr marL="514350" indent="-514350">
-              <a:buFont typeface="+mj-lt"/>
-              <a:buAutoNum type="arabicPeriod"/>
-            </a:pPr>
-            <a:r>
-              <a:rPr lang="en-US" dirty="0" smtClean="0"/>
-              <a:t>Added Target Texture</a:t>
+              <a:t>Enemy Textures</a:t>
             </a:r>
             <a:endParaRPr lang="en-US" dirty="0"/>
           </a:p>

</xml_diff>

<commit_message>
Finished adding slides to presentation, just need a background template that fits
</commit_message>
<xml_diff>
--- a/Documentation/PresentationAlpha.pptx
+++ b/Documentation/PresentationAlpha.pptx
@@ -7,14 +7,16 @@
   <p:sldIdLst>
     <p:sldId id="256" r:id="rId2"/>
     <p:sldId id="263" r:id="rId3"/>
-    <p:sldId id="261" r:id="rId4"/>
-    <p:sldId id="268" r:id="rId5"/>
-    <p:sldId id="271" r:id="rId6"/>
-    <p:sldId id="269" r:id="rId7"/>
-    <p:sldId id="270" r:id="rId8"/>
-    <p:sldId id="272" r:id="rId9"/>
-    <p:sldId id="273" r:id="rId10"/>
-    <p:sldId id="274" r:id="rId11"/>
+    <p:sldId id="275" r:id="rId4"/>
+    <p:sldId id="276" r:id="rId5"/>
+    <p:sldId id="261" r:id="rId6"/>
+    <p:sldId id="268" r:id="rId7"/>
+    <p:sldId id="271" r:id="rId8"/>
+    <p:sldId id="269" r:id="rId9"/>
+    <p:sldId id="270" r:id="rId10"/>
+    <p:sldId id="272" r:id="rId11"/>
+    <p:sldId id="273" r:id="rId12"/>
+    <p:sldId id="274" r:id="rId13"/>
   </p:sldIdLst>
   <p:sldSz cx="12192000" cy="6858000"/>
   <p:notesSz cx="6858000" cy="9144000"/>
@@ -115,7 +117,7 @@
   </p:defaultTextStyle>
   <p:extLst>
     <p:ext uri="{EFAFB233-063F-42B5-8137-9DF3F51BA10A}">
-      <p15:sldGuideLst xmlns:p15="http://schemas.microsoft.com/office/powerpoint/2012/main">
+      <p15:sldGuideLst xmlns:p15="http://schemas.microsoft.com/office/powerpoint/2012/main" xmlns="">
         <p15:guide id="1" orient="horz" pos="2160">
           <p15:clr>
             <a:srgbClr val="A4A3A4"/>
@@ -261,7 +263,7 @@
           <a:p>
             <a:fld id="{5CEF22E0-9ED4-437F-9483-C95BD90B631F}" type="datetimeFigureOut">
               <a:rPr lang="en-US" smtClean="0"/>
-              <a:t>4/11/2017</a:t>
+              <a:t>4/12/2017</a:t>
             </a:fld>
             <a:endParaRPr lang="en-US" dirty="0"/>
           </a:p>
@@ -429,7 +431,7 @@
           <a:p>
             <a:fld id="{5CEF22E0-9ED4-437F-9483-C95BD90B631F}" type="datetimeFigureOut">
               <a:rPr lang="en-US" smtClean="0"/>
-              <a:t>4/11/2017</a:t>
+              <a:t>4/12/2017</a:t>
             </a:fld>
             <a:endParaRPr lang="en-US" dirty="0"/>
           </a:p>
@@ -607,7 +609,7 @@
           <a:p>
             <a:fld id="{5CEF22E0-9ED4-437F-9483-C95BD90B631F}" type="datetimeFigureOut">
               <a:rPr lang="en-US" smtClean="0"/>
-              <a:t>4/11/2017</a:t>
+              <a:t>4/12/2017</a:t>
             </a:fld>
             <a:endParaRPr lang="en-US" dirty="0"/>
           </a:p>
@@ -775,7 +777,7 @@
           <a:p>
             <a:fld id="{5CEF22E0-9ED4-437F-9483-C95BD90B631F}" type="datetimeFigureOut">
               <a:rPr lang="en-US" smtClean="0"/>
-              <a:t>4/11/2017</a:t>
+              <a:t>4/12/2017</a:t>
             </a:fld>
             <a:endParaRPr lang="en-US" dirty="0"/>
           </a:p>
@@ -1020,7 +1022,7 @@
           <a:p>
             <a:fld id="{5CEF22E0-9ED4-437F-9483-C95BD90B631F}" type="datetimeFigureOut">
               <a:rPr lang="en-US" smtClean="0"/>
-              <a:t>4/11/2017</a:t>
+              <a:t>4/12/2017</a:t>
             </a:fld>
             <a:endParaRPr lang="en-US" dirty="0"/>
           </a:p>
@@ -1249,7 +1251,7 @@
           <a:p>
             <a:fld id="{5CEF22E0-9ED4-437F-9483-C95BD90B631F}" type="datetimeFigureOut">
               <a:rPr lang="en-US" smtClean="0"/>
-              <a:t>4/11/2017</a:t>
+              <a:t>4/12/2017</a:t>
             </a:fld>
             <a:endParaRPr lang="en-US" dirty="0"/>
           </a:p>
@@ -1613,7 +1615,7 @@
           <a:p>
             <a:fld id="{5CEF22E0-9ED4-437F-9483-C95BD90B631F}" type="datetimeFigureOut">
               <a:rPr lang="en-US" smtClean="0"/>
-              <a:t>4/11/2017</a:t>
+              <a:t>4/12/2017</a:t>
             </a:fld>
             <a:endParaRPr lang="en-US" dirty="0"/>
           </a:p>
@@ -1730,7 +1732,7 @@
           <a:p>
             <a:fld id="{5CEF22E0-9ED4-437F-9483-C95BD90B631F}" type="datetimeFigureOut">
               <a:rPr lang="en-US" smtClean="0"/>
-              <a:t>4/11/2017</a:t>
+              <a:t>4/12/2017</a:t>
             </a:fld>
             <a:endParaRPr lang="en-US" dirty="0"/>
           </a:p>
@@ -1825,7 +1827,7 @@
           <a:p>
             <a:fld id="{5CEF22E0-9ED4-437F-9483-C95BD90B631F}" type="datetimeFigureOut">
               <a:rPr lang="en-US" smtClean="0"/>
-              <a:t>4/11/2017</a:t>
+              <a:t>4/12/2017</a:t>
             </a:fld>
             <a:endParaRPr lang="en-US" dirty="0"/>
           </a:p>
@@ -2100,7 +2102,7 @@
           <a:p>
             <a:fld id="{5CEF22E0-9ED4-437F-9483-C95BD90B631F}" type="datetimeFigureOut">
               <a:rPr lang="en-US" smtClean="0"/>
-              <a:t>4/11/2017</a:t>
+              <a:t>4/12/2017</a:t>
             </a:fld>
             <a:endParaRPr lang="en-US" dirty="0"/>
           </a:p>
@@ -2352,7 +2354,7 @@
           <a:p>
             <a:fld id="{5CEF22E0-9ED4-437F-9483-C95BD90B631F}" type="datetimeFigureOut">
               <a:rPr lang="en-US" smtClean="0"/>
-              <a:t>4/11/2017</a:t>
+              <a:t>4/12/2017</a:t>
             </a:fld>
             <a:endParaRPr lang="en-US" dirty="0"/>
           </a:p>
@@ -2563,7 +2565,7 @@
           <a:p>
             <a:fld id="{5CEF22E0-9ED4-437F-9483-C95BD90B631F}" type="datetimeFigureOut">
               <a:rPr lang="en-US" smtClean="0"/>
-              <a:t>4/11/2017</a:t>
+              <a:t>4/12/2017</a:t>
             </a:fld>
             <a:endParaRPr lang="en-US" dirty="0"/>
           </a:p>
@@ -3074,6 +3076,416 @@
       </p:grpSpPr>
       <p:sp>
         <p:nvSpPr>
+          <p:cNvPr id="5" name="Title 4"/>
+          <p:cNvSpPr>
+            <a:spLocks noGrp="1"/>
+          </p:cNvSpPr>
+          <p:nvPr>
+            <p:ph type="title"/>
+          </p:nvPr>
+        </p:nvSpPr>
+        <p:spPr/>
+        <p:txBody>
+          <a:bodyPr/>
+          <a:lstStyle/>
+          <a:p>
+            <a:r>
+              <a:rPr lang="en-US" dirty="0" smtClean="0"/>
+              <a:t>Beta Game Content Target</a:t>
+            </a:r>
+            <a:endParaRPr lang="en-US" dirty="0"/>
+          </a:p>
+        </p:txBody>
+      </p:sp>
+      <p:sp>
+        <p:nvSpPr>
+          <p:cNvPr id="6" name="Content Placeholder 5"/>
+          <p:cNvSpPr>
+            <a:spLocks noGrp="1"/>
+          </p:cNvSpPr>
+          <p:nvPr>
+            <p:ph sz="half" idx="1"/>
+          </p:nvPr>
+        </p:nvSpPr>
+        <p:spPr/>
+        <p:txBody>
+          <a:bodyPr>
+            <a:normAutofit/>
+          </a:bodyPr>
+          <a:lstStyle/>
+          <a:p>
+            <a:pPr marL="0" indent="0">
+              <a:buNone/>
+            </a:pPr>
+            <a:r>
+              <a:rPr lang="en-US" dirty="0"/>
+              <a:t>E</a:t>
+            </a:r>
+            <a:r>
+              <a:rPr lang="en-US" dirty="0" smtClean="0"/>
+              <a:t>nemies:</a:t>
+            </a:r>
+          </a:p>
+          <a:p>
+            <a:pPr marL="971550" lvl="1" indent="-514350">
+              <a:buFont typeface="+mj-lt"/>
+              <a:buAutoNum type="arabicPeriod"/>
+            </a:pPr>
+            <a:r>
+              <a:rPr lang="en-US" dirty="0" smtClean="0"/>
+              <a:t>Area 3 Enemies</a:t>
+            </a:r>
+          </a:p>
+          <a:p>
+            <a:pPr marL="971550" lvl="1" indent="-514350">
+              <a:buFont typeface="+mj-lt"/>
+              <a:buAutoNum type="arabicPeriod"/>
+            </a:pPr>
+            <a:r>
+              <a:rPr lang="en-US" dirty="0" smtClean="0"/>
+              <a:t>Area 2 Boss</a:t>
+            </a:r>
+          </a:p>
+          <a:p>
+            <a:pPr marL="971550" lvl="1" indent="-514350">
+              <a:buFont typeface="+mj-lt"/>
+              <a:buAutoNum type="arabicPeriod"/>
+            </a:pPr>
+            <a:r>
+              <a:rPr lang="en-US" dirty="0" smtClean="0"/>
+              <a:t>Area 3 Boss</a:t>
+            </a:r>
+          </a:p>
+          <a:p>
+            <a:pPr marL="971550" lvl="1" indent="-514350">
+              <a:buFont typeface="+mj-lt"/>
+              <a:buAutoNum type="arabicPeriod"/>
+            </a:pPr>
+            <a:r>
+              <a:rPr lang="en-US" dirty="0" smtClean="0"/>
+              <a:t>Final Boss</a:t>
+            </a:r>
+          </a:p>
+        </p:txBody>
+      </p:sp>
+      <p:sp>
+        <p:nvSpPr>
+          <p:cNvPr id="7" name="Content Placeholder 6"/>
+          <p:cNvSpPr>
+            <a:spLocks noGrp="1"/>
+          </p:cNvSpPr>
+          <p:nvPr>
+            <p:ph sz="half" idx="2"/>
+          </p:nvPr>
+        </p:nvSpPr>
+        <p:spPr/>
+        <p:txBody>
+          <a:bodyPr>
+            <a:normAutofit/>
+          </a:bodyPr>
+          <a:lstStyle/>
+          <a:p>
+            <a:pPr marL="0" indent="0">
+              <a:buNone/>
+            </a:pPr>
+            <a:r>
+              <a:rPr lang="en-US" dirty="0" smtClean="0"/>
+              <a:t>Player </a:t>
+            </a:r>
+            <a:r>
+              <a:rPr lang="en-US" dirty="0"/>
+              <a:t>Spells:</a:t>
+            </a:r>
+          </a:p>
+          <a:p>
+            <a:pPr marL="971550" lvl="1" indent="-514350">
+              <a:buFont typeface="+mj-lt"/>
+              <a:buAutoNum type="arabicPeriod"/>
+            </a:pPr>
+            <a:r>
+              <a:rPr lang="en-US" dirty="0"/>
+              <a:t>Arc Lightning</a:t>
+            </a:r>
+          </a:p>
+          <a:p>
+            <a:pPr marL="971550" lvl="1" indent="-514350">
+              <a:buFont typeface="+mj-lt"/>
+              <a:buAutoNum type="arabicPeriod"/>
+            </a:pPr>
+            <a:r>
+              <a:rPr lang="en-US" dirty="0"/>
+              <a:t>Acid Pool</a:t>
+            </a:r>
+          </a:p>
+          <a:p>
+            <a:pPr marL="971550" lvl="1" indent="-514350">
+              <a:buFont typeface="+mj-lt"/>
+              <a:buAutoNum type="arabicPeriod"/>
+            </a:pPr>
+            <a:r>
+              <a:rPr lang="en-US" dirty="0"/>
+              <a:t>Ring of Fire</a:t>
+            </a:r>
+          </a:p>
+          <a:p>
+            <a:pPr marL="971550" lvl="1" indent="-514350">
+              <a:buFont typeface="+mj-lt"/>
+              <a:buAutoNum type="arabicPeriod"/>
+            </a:pPr>
+            <a:r>
+              <a:rPr lang="en-US" dirty="0"/>
+              <a:t>Dragon Scale </a:t>
+            </a:r>
+            <a:r>
+              <a:rPr lang="en-US" dirty="0" smtClean="0"/>
+              <a:t>Stream</a:t>
+            </a:r>
+          </a:p>
+          <a:p>
+            <a:pPr marL="971550" lvl="1" indent="-514350">
+              <a:buFont typeface="+mj-lt"/>
+              <a:buAutoNum type="arabicPeriod"/>
+            </a:pPr>
+            <a:r>
+              <a:rPr lang="en-US" dirty="0" smtClean="0"/>
+              <a:t>Water Stream</a:t>
+            </a:r>
+            <a:endParaRPr lang="en-US" dirty="0"/>
+          </a:p>
+          <a:p>
+            <a:pPr marL="0" indent="0">
+              <a:buNone/>
+            </a:pPr>
+            <a:endParaRPr lang="en-US" dirty="0"/>
+          </a:p>
+        </p:txBody>
+      </p:sp>
+      <p:pic>
+        <p:nvPicPr>
+          <p:cNvPr id="8" name="Picture 7"/>
+          <p:cNvPicPr>
+            <a:picLocks noChangeAspect="1"/>
+          </p:cNvPicPr>
+          <p:nvPr/>
+        </p:nvPicPr>
+        <p:blipFill>
+          <a:blip r:embed="rId2" cstate="print">
+            <a:extLst>
+              <a:ext uri="{28A0092B-C50C-407E-A947-70E740481C1C}">
+                <a14:useLocalDpi xmlns:a14="http://schemas.microsoft.com/office/drawing/2010/main" val="0"/>
+              </a:ext>
+            </a:extLst>
+          </a:blip>
+          <a:stretch>
+            <a:fillRect/>
+          </a:stretch>
+        </p:blipFill>
+        <p:spPr>
+          <a:xfrm>
+            <a:off x="11126825" y="-1"/>
+            <a:ext cx="1065175" cy="612475"/>
+          </a:xfrm>
+          <a:prstGeom prst="rect">
+            <a:avLst/>
+          </a:prstGeom>
+        </p:spPr>
+      </p:pic>
+    </p:spTree>
+    <p:extLst>
+      <p:ext uri="{BB962C8B-B14F-4D97-AF65-F5344CB8AC3E}">
+        <p14:creationId xmlns:p14="http://schemas.microsoft.com/office/powerpoint/2010/main" val="2765259884"/>
+      </p:ext>
+    </p:extLst>
+  </p:cSld>
+  <p:clrMapOvr>
+    <a:masterClrMapping/>
+  </p:clrMapOvr>
+</p:sld>
+</file>
+
+<file path=ppt/slides/slide11.xml><?xml version="1.0" encoding="utf-8"?>
+<p:sld xmlns:a="http://schemas.openxmlformats.org/drawingml/2006/main" xmlns:r="http://schemas.openxmlformats.org/officeDocument/2006/relationships" xmlns:p="http://schemas.openxmlformats.org/presentationml/2006/main">
+  <p:cSld>
+    <p:spTree>
+      <p:nvGrpSpPr>
+        <p:cNvPr id="1" name=""/>
+        <p:cNvGrpSpPr/>
+        <p:nvPr/>
+      </p:nvGrpSpPr>
+      <p:grpSpPr>
+        <a:xfrm>
+          <a:off x="0" y="0"/>
+          <a:ext cx="0" cy="0"/>
+          <a:chOff x="0" y="0"/>
+          <a:chExt cx="0" cy="0"/>
+        </a:xfrm>
+      </p:grpSpPr>
+      <p:sp>
+        <p:nvSpPr>
+          <p:cNvPr id="2" name="Title 1"/>
+          <p:cNvSpPr>
+            <a:spLocks noGrp="1"/>
+          </p:cNvSpPr>
+          <p:nvPr>
+            <p:ph type="title"/>
+          </p:nvPr>
+        </p:nvSpPr>
+        <p:spPr/>
+        <p:txBody>
+          <a:bodyPr/>
+          <a:lstStyle/>
+          <a:p>
+            <a:r>
+              <a:rPr lang="en-US" dirty="0" smtClean="0"/>
+              <a:t>Beta Art Content Target</a:t>
+            </a:r>
+            <a:endParaRPr lang="en-US" dirty="0"/>
+          </a:p>
+        </p:txBody>
+      </p:sp>
+      <p:sp>
+        <p:nvSpPr>
+          <p:cNvPr id="3" name="Content Placeholder 2"/>
+          <p:cNvSpPr>
+            <a:spLocks noGrp="1"/>
+          </p:cNvSpPr>
+          <p:nvPr>
+            <p:ph sz="half" idx="1"/>
+          </p:nvPr>
+        </p:nvSpPr>
+        <p:spPr/>
+        <p:txBody>
+          <a:bodyPr/>
+          <a:lstStyle/>
+          <a:p>
+            <a:pPr marL="514350" indent="-514350">
+              <a:buFont typeface="+mj-lt"/>
+              <a:buAutoNum type="arabicPeriod"/>
+            </a:pPr>
+            <a:r>
+              <a:rPr lang="en-US" dirty="0" smtClean="0"/>
+              <a:t>Enemy Attack Animations</a:t>
+            </a:r>
+          </a:p>
+          <a:p>
+            <a:pPr marL="514350" indent="-514350">
+              <a:buFont typeface="+mj-lt"/>
+              <a:buAutoNum type="arabicPeriod"/>
+            </a:pPr>
+            <a:r>
+              <a:rPr lang="en-US" dirty="0" smtClean="0"/>
+              <a:t>Enemy Movement Animations</a:t>
+            </a:r>
+            <a:endParaRPr lang="en-US" dirty="0"/>
+          </a:p>
+        </p:txBody>
+      </p:sp>
+      <p:sp>
+        <p:nvSpPr>
+          <p:cNvPr id="4" name="Content Placeholder 3"/>
+          <p:cNvSpPr>
+            <a:spLocks noGrp="1"/>
+          </p:cNvSpPr>
+          <p:nvPr>
+            <p:ph sz="half" idx="2"/>
+          </p:nvPr>
+        </p:nvSpPr>
+        <p:spPr/>
+        <p:txBody>
+          <a:bodyPr/>
+          <a:lstStyle/>
+          <a:p>
+            <a:pPr marL="0" indent="0">
+              <a:buNone/>
+            </a:pPr>
+            <a:r>
+              <a:rPr lang="en-US" dirty="0" smtClean="0"/>
+              <a:t>3.   Player Spell Animations</a:t>
+            </a:r>
+          </a:p>
+          <a:p>
+            <a:pPr marL="0" indent="0">
+              <a:buNone/>
+            </a:pPr>
+            <a:r>
+              <a:rPr lang="en-US" dirty="0" smtClean="0"/>
+              <a:t>4.   Boss Attack Animations</a:t>
+            </a:r>
+          </a:p>
+          <a:p>
+            <a:pPr marL="0" indent="0">
+              <a:buNone/>
+            </a:pPr>
+            <a:r>
+              <a:rPr lang="en-US" dirty="0" smtClean="0"/>
+              <a:t>5.   Boss Movement Animations</a:t>
+            </a:r>
+            <a:endParaRPr lang="en-US" dirty="0"/>
+          </a:p>
+        </p:txBody>
+      </p:sp>
+      <p:pic>
+        <p:nvPicPr>
+          <p:cNvPr id="5" name="Picture 4"/>
+          <p:cNvPicPr>
+            <a:picLocks noChangeAspect="1"/>
+          </p:cNvPicPr>
+          <p:nvPr/>
+        </p:nvPicPr>
+        <p:blipFill>
+          <a:blip r:embed="rId2" cstate="print">
+            <a:extLst>
+              <a:ext uri="{28A0092B-C50C-407E-A947-70E740481C1C}">
+                <a14:useLocalDpi xmlns:a14="http://schemas.microsoft.com/office/drawing/2010/main" val="0"/>
+              </a:ext>
+            </a:extLst>
+          </a:blip>
+          <a:stretch>
+            <a:fillRect/>
+          </a:stretch>
+        </p:blipFill>
+        <p:spPr>
+          <a:xfrm>
+            <a:off x="11126825" y="-1"/>
+            <a:ext cx="1065175" cy="612475"/>
+          </a:xfrm>
+          <a:prstGeom prst="rect">
+            <a:avLst/>
+          </a:prstGeom>
+        </p:spPr>
+      </p:pic>
+    </p:spTree>
+    <p:extLst>
+      <p:ext uri="{BB962C8B-B14F-4D97-AF65-F5344CB8AC3E}">
+        <p14:creationId xmlns:p14="http://schemas.microsoft.com/office/powerpoint/2010/main" val="1682894602"/>
+      </p:ext>
+    </p:extLst>
+  </p:cSld>
+  <p:clrMapOvr>
+    <a:masterClrMapping/>
+  </p:clrMapOvr>
+</p:sld>
+</file>
+
+<file path=ppt/slides/slide12.xml><?xml version="1.0" encoding="utf-8"?>
+<p:sld xmlns:a="http://schemas.openxmlformats.org/drawingml/2006/main" xmlns:r="http://schemas.openxmlformats.org/officeDocument/2006/relationships" xmlns:p="http://schemas.openxmlformats.org/presentationml/2006/main">
+  <p:cSld>
+    <p:spTree>
+      <p:nvGrpSpPr>
+        <p:cNvPr id="1" name=""/>
+        <p:cNvGrpSpPr/>
+        <p:nvPr/>
+      </p:nvGrpSpPr>
+      <p:grpSpPr>
+        <a:xfrm>
+          <a:off x="0" y="0"/>
+          <a:ext cx="0" cy="0"/>
+          <a:chOff x="0" y="0"/>
+          <a:chExt cx="0" cy="0"/>
+        </a:xfrm>
+      </p:grpSpPr>
+      <p:sp>
+        <p:nvSpPr>
           <p:cNvPr id="2" name="Title 1"/>
           <p:cNvSpPr>
             <a:spLocks noGrp="1"/>
@@ -3412,6 +3824,248 @@
 <file path=ppt/slides/slide3.xml><?xml version="1.0" encoding="utf-8"?>
 <p:sld xmlns:a="http://schemas.openxmlformats.org/drawingml/2006/main" xmlns:r="http://schemas.openxmlformats.org/officeDocument/2006/relationships" xmlns:p="http://schemas.openxmlformats.org/presentationml/2006/main">
   <p:cSld>
+    <p:spTree>
+      <p:nvGrpSpPr>
+        <p:cNvPr id="1" name=""/>
+        <p:cNvGrpSpPr/>
+        <p:nvPr/>
+      </p:nvGrpSpPr>
+      <p:grpSpPr>
+        <a:xfrm>
+          <a:off x="0" y="0"/>
+          <a:ext cx="0" cy="0"/>
+          <a:chOff x="0" y="0"/>
+          <a:chExt cx="0" cy="0"/>
+        </a:xfrm>
+      </p:grpSpPr>
+      <p:sp>
+        <p:nvSpPr>
+          <p:cNvPr id="2" name="Title 1"/>
+          <p:cNvSpPr>
+            <a:spLocks noGrp="1"/>
+          </p:cNvSpPr>
+          <p:nvPr>
+            <p:ph type="title"/>
+          </p:nvPr>
+        </p:nvSpPr>
+        <p:spPr/>
+        <p:txBody>
+          <a:bodyPr/>
+          <a:lstStyle/>
+          <a:p>
+            <a:pPr algn="ctr"/>
+            <a:r>
+              <a:rPr lang="en-US" dirty="0" smtClean="0"/>
+              <a:t>Overview</a:t>
+            </a:r>
+            <a:endParaRPr lang="en-US" dirty="0"/>
+          </a:p>
+        </p:txBody>
+      </p:sp>
+      <p:sp>
+        <p:nvSpPr>
+          <p:cNvPr id="3" name="Content Placeholder 2"/>
+          <p:cNvSpPr>
+            <a:spLocks noGrp="1"/>
+          </p:cNvSpPr>
+          <p:nvPr>
+            <p:ph idx="1"/>
+          </p:nvPr>
+        </p:nvSpPr>
+        <p:spPr/>
+        <p:txBody>
+          <a:bodyPr/>
+          <a:lstStyle/>
+          <a:p>
+            <a:r>
+              <a:rPr lang="en-US" sz="2400" dirty="0" smtClean="0"/>
+              <a:t>Game Demo</a:t>
+            </a:r>
+          </a:p>
+          <a:p>
+            <a:r>
+              <a:rPr lang="en-US" sz="2400" dirty="0" smtClean="0"/>
+              <a:t>New Features</a:t>
+            </a:r>
+          </a:p>
+          <a:p>
+            <a:r>
+              <a:rPr lang="en-US" sz="2400" dirty="0" smtClean="0"/>
+              <a:t>New Audio Assets</a:t>
+            </a:r>
+          </a:p>
+          <a:p>
+            <a:pPr lvl="2"/>
+            <a:r>
+              <a:rPr lang="en-US" sz="1800" dirty="0" smtClean="0"/>
+              <a:t>Sound Effect Showcase</a:t>
+            </a:r>
+          </a:p>
+          <a:p>
+            <a:r>
+              <a:rPr lang="en-US" sz="2400" dirty="0" smtClean="0"/>
+              <a:t>New Art Assets</a:t>
+            </a:r>
+          </a:p>
+          <a:p>
+            <a:pPr lvl="2"/>
+            <a:r>
+              <a:rPr lang="en-US" sz="1800" dirty="0" smtClean="0"/>
+              <a:t>Art Showcase</a:t>
+            </a:r>
+          </a:p>
+          <a:p>
+            <a:r>
+              <a:rPr lang="en-US" sz="2400" dirty="0" smtClean="0"/>
+              <a:t>Beta Targets</a:t>
+            </a:r>
+          </a:p>
+          <a:p>
+            <a:pPr lvl="2"/>
+            <a:r>
+              <a:rPr lang="en-US" sz="1800" dirty="0" smtClean="0"/>
+              <a:t>Feature Content Target</a:t>
+            </a:r>
+          </a:p>
+          <a:p>
+            <a:pPr lvl="2"/>
+            <a:r>
+              <a:rPr lang="en-US" sz="1800" dirty="0" smtClean="0"/>
+              <a:t>Art Content Target</a:t>
+            </a:r>
+          </a:p>
+          <a:p>
+            <a:pPr lvl="2"/>
+            <a:r>
+              <a:rPr lang="en-US" sz="1800" dirty="0" smtClean="0"/>
+              <a:t>Audio Content Target</a:t>
+            </a:r>
+          </a:p>
+          <a:p>
+            <a:pPr lvl="2" algn="ctr"/>
+            <a:endParaRPr lang="en-US" dirty="0" smtClean="0"/>
+          </a:p>
+        </p:txBody>
+      </p:sp>
+      <p:pic>
+        <p:nvPicPr>
+          <p:cNvPr id="4" name="Picture 3"/>
+          <p:cNvPicPr>
+            <a:picLocks noChangeAspect="1"/>
+          </p:cNvPicPr>
+          <p:nvPr/>
+        </p:nvPicPr>
+        <p:blipFill>
+          <a:blip r:embed="rId2" cstate="print">
+            <a:extLst>
+              <a:ext uri="{28A0092B-C50C-407E-A947-70E740481C1C}">
+                <a14:useLocalDpi xmlns:a14="http://schemas.microsoft.com/office/drawing/2010/main" val="0"/>
+              </a:ext>
+            </a:extLst>
+          </a:blip>
+          <a:stretch>
+            <a:fillRect/>
+          </a:stretch>
+        </p:blipFill>
+        <p:spPr>
+          <a:xfrm>
+            <a:off x="11126825" y="-1"/>
+            <a:ext cx="1065175" cy="612475"/>
+          </a:xfrm>
+          <a:prstGeom prst="rect">
+            <a:avLst/>
+          </a:prstGeom>
+        </p:spPr>
+      </p:pic>
+    </p:spTree>
+    <p:extLst>
+      <p:ext uri="{BB962C8B-B14F-4D97-AF65-F5344CB8AC3E}">
+        <p14:creationId xmlns:p14="http://schemas.microsoft.com/office/powerpoint/2010/main" val="2428150957"/>
+      </p:ext>
+    </p:extLst>
+  </p:cSld>
+  <p:clrMapOvr>
+    <a:masterClrMapping/>
+  </p:clrMapOvr>
+</p:sld>
+</file>
+
+<file path=ppt/slides/slide4.xml><?xml version="1.0" encoding="utf-8"?>
+<p:sld xmlns:a="http://schemas.openxmlformats.org/drawingml/2006/main" xmlns:r="http://schemas.openxmlformats.org/officeDocument/2006/relationships" xmlns:p="http://schemas.openxmlformats.org/presentationml/2006/main">
+  <p:cSld>
+    <p:spTree>
+      <p:nvGrpSpPr>
+        <p:cNvPr id="1" name=""/>
+        <p:cNvGrpSpPr/>
+        <p:nvPr/>
+      </p:nvGrpSpPr>
+      <p:grpSpPr>
+        <a:xfrm>
+          <a:off x="0" y="0"/>
+          <a:ext cx="0" cy="0"/>
+          <a:chOff x="0" y="0"/>
+          <a:chExt cx="0" cy="0"/>
+        </a:xfrm>
+      </p:grpSpPr>
+      <p:sp>
+        <p:nvSpPr>
+          <p:cNvPr id="2" name="Title 1"/>
+          <p:cNvSpPr>
+            <a:spLocks noGrp="1"/>
+          </p:cNvSpPr>
+          <p:nvPr>
+            <p:ph type="title"/>
+          </p:nvPr>
+        </p:nvSpPr>
+        <p:spPr/>
+        <p:txBody>
+          <a:bodyPr/>
+          <a:lstStyle/>
+          <a:p>
+            <a:pPr algn="ctr"/>
+            <a:r>
+              <a:rPr lang="en-US" dirty="0" smtClean="0"/>
+              <a:t>Game Demo</a:t>
+            </a:r>
+            <a:endParaRPr lang="en-US" dirty="0"/>
+          </a:p>
+        </p:txBody>
+      </p:sp>
+      <p:sp>
+        <p:nvSpPr>
+          <p:cNvPr id="3" name="Content Placeholder 2"/>
+          <p:cNvSpPr>
+            <a:spLocks noGrp="1"/>
+          </p:cNvSpPr>
+          <p:nvPr>
+            <p:ph idx="1"/>
+          </p:nvPr>
+        </p:nvSpPr>
+        <p:spPr/>
+        <p:txBody>
+          <a:bodyPr/>
+          <a:lstStyle/>
+          <a:p>
+            <a:endParaRPr lang="en-US"/>
+          </a:p>
+        </p:txBody>
+      </p:sp>
+    </p:spTree>
+    <p:extLst>
+      <p:ext uri="{BB962C8B-B14F-4D97-AF65-F5344CB8AC3E}">
+        <p14:creationId xmlns:p14="http://schemas.microsoft.com/office/powerpoint/2010/main" val="3777182920"/>
+      </p:ext>
+    </p:extLst>
+  </p:cSld>
+  <p:clrMapOvr>
+    <a:masterClrMapping/>
+  </p:clrMapOvr>
+</p:sld>
+</file>
+
+<file path=ppt/slides/slide5.xml><?xml version="1.0" encoding="utf-8"?>
+<p:sld xmlns:a="http://schemas.openxmlformats.org/drawingml/2006/main" xmlns:r="http://schemas.openxmlformats.org/officeDocument/2006/relationships" xmlns:p="http://schemas.openxmlformats.org/presentationml/2006/main">
+  <p:cSld>
     <p:bg>
       <p:bgPr>
         <a:blipFill dpi="0" rotWithShape="1">
@@ -3789,7 +4443,7 @@
 </p:sld>
 </file>
 
-<file path=ppt/slides/slide4.xml><?xml version="1.0" encoding="utf-8"?>
+<file path=ppt/slides/slide6.xml><?xml version="1.0" encoding="utf-8"?>
 <p:sld xmlns:a="http://schemas.openxmlformats.org/drawingml/2006/main" xmlns:r="http://schemas.openxmlformats.org/officeDocument/2006/relationships" xmlns:p="http://schemas.openxmlformats.org/presentationml/2006/main">
   <p:cSld>
     <p:spTree>
@@ -3854,7 +4508,6 @@
               <a:rPr lang="en-US" dirty="0" smtClean="0"/>
               <a:t>Player Sound Effects</a:t>
             </a:r>
-            <a:endParaRPr lang="en-US" dirty="0" smtClean="0"/>
           </a:p>
           <a:p>
             <a:pPr marL="971550" lvl="1" indent="-514350">
@@ -3875,7 +4528,6 @@
               <a:rPr lang="en-US" dirty="0" smtClean="0"/>
               <a:t>Explosion Sound Effect</a:t>
             </a:r>
-            <a:endParaRPr lang="en-US" dirty="0" smtClean="0"/>
           </a:p>
         </p:txBody>
       </p:sp>
@@ -3929,7 +4581,6 @@
               <a:rPr lang="en-US" dirty="0" smtClean="0"/>
               <a:t>Death Sounds</a:t>
             </a:r>
-            <a:endParaRPr lang="en-US" dirty="0" smtClean="0"/>
           </a:p>
           <a:p>
             <a:pPr marL="971550" lvl="1" indent="-514350">
@@ -3997,7 +4648,7 @@
 </p:sld>
 </file>
 
-<file path=ppt/slides/slide5.xml><?xml version="1.0" encoding="utf-8"?>
+<file path=ppt/slides/slide7.xml><?xml version="1.0" encoding="utf-8"?>
 <p:sld xmlns:a="http://schemas.openxmlformats.org/drawingml/2006/main" xmlns:r="http://schemas.openxmlformats.org/officeDocument/2006/relationships" xmlns:p="http://schemas.openxmlformats.org/presentationml/2006/main">
   <p:cSld>
     <p:spTree>
@@ -4080,7 +4731,7 @@
 </p:sld>
 </file>
 
-<file path=ppt/slides/slide6.xml><?xml version="1.0" encoding="utf-8"?>
+<file path=ppt/slides/slide8.xml><?xml version="1.0" encoding="utf-8"?>
 <p:sld xmlns:a="http://schemas.openxmlformats.org/drawingml/2006/main" xmlns:r="http://schemas.openxmlformats.org/officeDocument/2006/relationships" xmlns:p="http://schemas.openxmlformats.org/presentationml/2006/main">
   <p:cSld>
     <p:spTree>
@@ -4218,7 +4869,6 @@
               <a:rPr lang="en-US" dirty="0" smtClean="0"/>
               <a:t>Area 2 Tiles</a:t>
             </a:r>
-            <a:endParaRPr lang="en-US" dirty="0" smtClean="0"/>
           </a:p>
           <a:p>
             <a:pPr marL="0" indent="0">
@@ -4333,7 +4983,7 @@
 </p:sld>
 </file>
 
-<file path=ppt/slides/slide7.xml><?xml version="1.0" encoding="utf-8"?>
+<file path=ppt/slides/slide9.xml><?xml version="1.0" encoding="utf-8"?>
 <p:sld xmlns:a="http://schemas.openxmlformats.org/drawingml/2006/main" xmlns:r="http://schemas.openxmlformats.org/officeDocument/2006/relationships" xmlns:p="http://schemas.openxmlformats.org/presentationml/2006/main">
   <p:cSld>
     <p:spTree>
@@ -4426,416 +5076,6 @@
     <p:extLst>
       <p:ext uri="{BB962C8B-B14F-4D97-AF65-F5344CB8AC3E}">
         <p14:creationId xmlns:p14="http://schemas.microsoft.com/office/powerpoint/2010/main" val="2561429922"/>
-      </p:ext>
-    </p:extLst>
-  </p:cSld>
-  <p:clrMapOvr>
-    <a:masterClrMapping/>
-  </p:clrMapOvr>
-</p:sld>
-</file>
-
-<file path=ppt/slides/slide8.xml><?xml version="1.0" encoding="utf-8"?>
-<p:sld xmlns:a="http://schemas.openxmlformats.org/drawingml/2006/main" xmlns:r="http://schemas.openxmlformats.org/officeDocument/2006/relationships" xmlns:p="http://schemas.openxmlformats.org/presentationml/2006/main">
-  <p:cSld>
-    <p:spTree>
-      <p:nvGrpSpPr>
-        <p:cNvPr id="1" name=""/>
-        <p:cNvGrpSpPr/>
-        <p:nvPr/>
-      </p:nvGrpSpPr>
-      <p:grpSpPr>
-        <a:xfrm>
-          <a:off x="0" y="0"/>
-          <a:ext cx="0" cy="0"/>
-          <a:chOff x="0" y="0"/>
-          <a:chExt cx="0" cy="0"/>
-        </a:xfrm>
-      </p:grpSpPr>
-      <p:sp>
-        <p:nvSpPr>
-          <p:cNvPr id="5" name="Title 4"/>
-          <p:cNvSpPr>
-            <a:spLocks noGrp="1"/>
-          </p:cNvSpPr>
-          <p:nvPr>
-            <p:ph type="title"/>
-          </p:nvPr>
-        </p:nvSpPr>
-        <p:spPr/>
-        <p:txBody>
-          <a:bodyPr/>
-          <a:lstStyle/>
-          <a:p>
-            <a:r>
-              <a:rPr lang="en-US" dirty="0" smtClean="0"/>
-              <a:t>Beta Game Content Target</a:t>
-            </a:r>
-            <a:endParaRPr lang="en-US" dirty="0"/>
-          </a:p>
-        </p:txBody>
-      </p:sp>
-      <p:sp>
-        <p:nvSpPr>
-          <p:cNvPr id="6" name="Content Placeholder 5"/>
-          <p:cNvSpPr>
-            <a:spLocks noGrp="1"/>
-          </p:cNvSpPr>
-          <p:nvPr>
-            <p:ph sz="half" idx="1"/>
-          </p:nvPr>
-        </p:nvSpPr>
-        <p:spPr/>
-        <p:txBody>
-          <a:bodyPr>
-            <a:normAutofit/>
-          </a:bodyPr>
-          <a:lstStyle/>
-          <a:p>
-            <a:pPr marL="0" indent="0">
-              <a:buNone/>
-            </a:pPr>
-            <a:r>
-              <a:rPr lang="en-US" dirty="0"/>
-              <a:t>E</a:t>
-            </a:r>
-            <a:r>
-              <a:rPr lang="en-US" dirty="0" smtClean="0"/>
-              <a:t>nemies:</a:t>
-            </a:r>
-          </a:p>
-          <a:p>
-            <a:pPr marL="971550" lvl="1" indent="-514350">
-              <a:buFont typeface="+mj-lt"/>
-              <a:buAutoNum type="arabicPeriod"/>
-            </a:pPr>
-            <a:r>
-              <a:rPr lang="en-US" dirty="0" smtClean="0"/>
-              <a:t>Area 3 Enemies</a:t>
-            </a:r>
-          </a:p>
-          <a:p>
-            <a:pPr marL="971550" lvl="1" indent="-514350">
-              <a:buFont typeface="+mj-lt"/>
-              <a:buAutoNum type="arabicPeriod"/>
-            </a:pPr>
-            <a:r>
-              <a:rPr lang="en-US" dirty="0" smtClean="0"/>
-              <a:t>Area 2 Boss</a:t>
-            </a:r>
-          </a:p>
-          <a:p>
-            <a:pPr marL="971550" lvl="1" indent="-514350">
-              <a:buFont typeface="+mj-lt"/>
-              <a:buAutoNum type="arabicPeriod"/>
-            </a:pPr>
-            <a:r>
-              <a:rPr lang="en-US" dirty="0" smtClean="0"/>
-              <a:t>Area 3 Boss</a:t>
-            </a:r>
-          </a:p>
-          <a:p>
-            <a:pPr marL="971550" lvl="1" indent="-514350">
-              <a:buFont typeface="+mj-lt"/>
-              <a:buAutoNum type="arabicPeriod"/>
-            </a:pPr>
-            <a:r>
-              <a:rPr lang="en-US" dirty="0" smtClean="0"/>
-              <a:t>Final Boss</a:t>
-            </a:r>
-          </a:p>
-        </p:txBody>
-      </p:sp>
-      <p:sp>
-        <p:nvSpPr>
-          <p:cNvPr id="7" name="Content Placeholder 6"/>
-          <p:cNvSpPr>
-            <a:spLocks noGrp="1"/>
-          </p:cNvSpPr>
-          <p:nvPr>
-            <p:ph sz="half" idx="2"/>
-          </p:nvPr>
-        </p:nvSpPr>
-        <p:spPr/>
-        <p:txBody>
-          <a:bodyPr>
-            <a:normAutofit/>
-          </a:bodyPr>
-          <a:lstStyle/>
-          <a:p>
-            <a:pPr marL="0" indent="0">
-              <a:buNone/>
-            </a:pPr>
-            <a:r>
-              <a:rPr lang="en-US" dirty="0" smtClean="0"/>
-              <a:t>Player </a:t>
-            </a:r>
-            <a:r>
-              <a:rPr lang="en-US" dirty="0"/>
-              <a:t>Spells:</a:t>
-            </a:r>
-          </a:p>
-          <a:p>
-            <a:pPr marL="971550" lvl="1" indent="-514350">
-              <a:buFont typeface="+mj-lt"/>
-              <a:buAutoNum type="arabicPeriod"/>
-            </a:pPr>
-            <a:r>
-              <a:rPr lang="en-US" dirty="0"/>
-              <a:t>Arc Lightning</a:t>
-            </a:r>
-          </a:p>
-          <a:p>
-            <a:pPr marL="971550" lvl="1" indent="-514350">
-              <a:buFont typeface="+mj-lt"/>
-              <a:buAutoNum type="arabicPeriod"/>
-            </a:pPr>
-            <a:r>
-              <a:rPr lang="en-US" dirty="0"/>
-              <a:t>Acid Pool</a:t>
-            </a:r>
-          </a:p>
-          <a:p>
-            <a:pPr marL="971550" lvl="1" indent="-514350">
-              <a:buFont typeface="+mj-lt"/>
-              <a:buAutoNum type="arabicPeriod"/>
-            </a:pPr>
-            <a:r>
-              <a:rPr lang="en-US" dirty="0"/>
-              <a:t>Ring of Fire</a:t>
-            </a:r>
-          </a:p>
-          <a:p>
-            <a:pPr marL="971550" lvl="1" indent="-514350">
-              <a:buFont typeface="+mj-lt"/>
-              <a:buAutoNum type="arabicPeriod"/>
-            </a:pPr>
-            <a:r>
-              <a:rPr lang="en-US" dirty="0"/>
-              <a:t>Dragon Scale </a:t>
-            </a:r>
-            <a:r>
-              <a:rPr lang="en-US" dirty="0" smtClean="0"/>
-              <a:t>Stream</a:t>
-            </a:r>
-          </a:p>
-          <a:p>
-            <a:pPr marL="971550" lvl="1" indent="-514350">
-              <a:buFont typeface="+mj-lt"/>
-              <a:buAutoNum type="arabicPeriod"/>
-            </a:pPr>
-            <a:r>
-              <a:rPr lang="en-US" dirty="0" smtClean="0"/>
-              <a:t>Water Stream</a:t>
-            </a:r>
-            <a:endParaRPr lang="en-US" dirty="0"/>
-          </a:p>
-          <a:p>
-            <a:pPr marL="0" indent="0">
-              <a:buNone/>
-            </a:pPr>
-            <a:endParaRPr lang="en-US" dirty="0"/>
-          </a:p>
-        </p:txBody>
-      </p:sp>
-      <p:pic>
-        <p:nvPicPr>
-          <p:cNvPr id="8" name="Picture 7"/>
-          <p:cNvPicPr>
-            <a:picLocks noChangeAspect="1"/>
-          </p:cNvPicPr>
-          <p:nvPr/>
-        </p:nvPicPr>
-        <p:blipFill>
-          <a:blip r:embed="rId2" cstate="print">
-            <a:extLst>
-              <a:ext uri="{28A0092B-C50C-407E-A947-70E740481C1C}">
-                <a14:useLocalDpi xmlns:a14="http://schemas.microsoft.com/office/drawing/2010/main" val="0"/>
-              </a:ext>
-            </a:extLst>
-          </a:blip>
-          <a:stretch>
-            <a:fillRect/>
-          </a:stretch>
-        </p:blipFill>
-        <p:spPr>
-          <a:xfrm>
-            <a:off x="11126825" y="-1"/>
-            <a:ext cx="1065175" cy="612475"/>
-          </a:xfrm>
-          <a:prstGeom prst="rect">
-            <a:avLst/>
-          </a:prstGeom>
-        </p:spPr>
-      </p:pic>
-    </p:spTree>
-    <p:extLst>
-      <p:ext uri="{BB962C8B-B14F-4D97-AF65-F5344CB8AC3E}">
-        <p14:creationId xmlns:p14="http://schemas.microsoft.com/office/powerpoint/2010/main" val="2765259884"/>
-      </p:ext>
-    </p:extLst>
-  </p:cSld>
-  <p:clrMapOvr>
-    <a:masterClrMapping/>
-  </p:clrMapOvr>
-</p:sld>
-</file>
-
-<file path=ppt/slides/slide9.xml><?xml version="1.0" encoding="utf-8"?>
-<p:sld xmlns:a="http://schemas.openxmlformats.org/drawingml/2006/main" xmlns:r="http://schemas.openxmlformats.org/officeDocument/2006/relationships" xmlns:p="http://schemas.openxmlformats.org/presentationml/2006/main">
-  <p:cSld>
-    <p:spTree>
-      <p:nvGrpSpPr>
-        <p:cNvPr id="1" name=""/>
-        <p:cNvGrpSpPr/>
-        <p:nvPr/>
-      </p:nvGrpSpPr>
-      <p:grpSpPr>
-        <a:xfrm>
-          <a:off x="0" y="0"/>
-          <a:ext cx="0" cy="0"/>
-          <a:chOff x="0" y="0"/>
-          <a:chExt cx="0" cy="0"/>
-        </a:xfrm>
-      </p:grpSpPr>
-      <p:sp>
-        <p:nvSpPr>
-          <p:cNvPr id="2" name="Title 1"/>
-          <p:cNvSpPr>
-            <a:spLocks noGrp="1"/>
-          </p:cNvSpPr>
-          <p:nvPr>
-            <p:ph type="title"/>
-          </p:nvPr>
-        </p:nvSpPr>
-        <p:spPr/>
-        <p:txBody>
-          <a:bodyPr/>
-          <a:lstStyle/>
-          <a:p>
-            <a:r>
-              <a:rPr lang="en-US" dirty="0" smtClean="0"/>
-              <a:t>Beta Art Content Target</a:t>
-            </a:r>
-            <a:endParaRPr lang="en-US" dirty="0"/>
-          </a:p>
-        </p:txBody>
-      </p:sp>
-      <p:sp>
-        <p:nvSpPr>
-          <p:cNvPr id="3" name="Content Placeholder 2"/>
-          <p:cNvSpPr>
-            <a:spLocks noGrp="1"/>
-          </p:cNvSpPr>
-          <p:nvPr>
-            <p:ph sz="half" idx="1"/>
-          </p:nvPr>
-        </p:nvSpPr>
-        <p:spPr/>
-        <p:txBody>
-          <a:bodyPr/>
-          <a:lstStyle/>
-          <a:p>
-            <a:pPr marL="514350" indent="-514350">
-              <a:buFont typeface="+mj-lt"/>
-              <a:buAutoNum type="arabicPeriod"/>
-            </a:pPr>
-            <a:r>
-              <a:rPr lang="en-US" dirty="0" smtClean="0"/>
-              <a:t>Enemy Attack Animations</a:t>
-            </a:r>
-          </a:p>
-          <a:p>
-            <a:pPr marL="514350" indent="-514350">
-              <a:buFont typeface="+mj-lt"/>
-              <a:buAutoNum type="arabicPeriod"/>
-            </a:pPr>
-            <a:r>
-              <a:rPr lang="en-US" dirty="0" smtClean="0"/>
-              <a:t>Enemy Movement Animations</a:t>
-            </a:r>
-            <a:endParaRPr lang="en-US" dirty="0"/>
-          </a:p>
-        </p:txBody>
-      </p:sp>
-      <p:sp>
-        <p:nvSpPr>
-          <p:cNvPr id="4" name="Content Placeholder 3"/>
-          <p:cNvSpPr>
-            <a:spLocks noGrp="1"/>
-          </p:cNvSpPr>
-          <p:nvPr>
-            <p:ph sz="half" idx="2"/>
-          </p:nvPr>
-        </p:nvSpPr>
-        <p:spPr/>
-        <p:txBody>
-          <a:bodyPr/>
-          <a:lstStyle/>
-          <a:p>
-            <a:pPr marL="0" indent="0">
-              <a:buNone/>
-            </a:pPr>
-            <a:r>
-              <a:rPr lang="en-US" dirty="0" smtClean="0"/>
-              <a:t>3.   Player Spell Animations</a:t>
-            </a:r>
-          </a:p>
-          <a:p>
-            <a:pPr marL="0" indent="0">
-              <a:buNone/>
-            </a:pPr>
-            <a:r>
-              <a:rPr lang="en-US" dirty="0" smtClean="0"/>
-              <a:t>4.   Boss Attack Animations</a:t>
-            </a:r>
-          </a:p>
-          <a:p>
-            <a:pPr marL="0" indent="0">
-              <a:buNone/>
-            </a:pPr>
-            <a:r>
-              <a:rPr lang="en-US" dirty="0" smtClean="0"/>
-              <a:t>5.   Boss Movement Animations</a:t>
-            </a:r>
-            <a:endParaRPr lang="en-US" dirty="0"/>
-          </a:p>
-        </p:txBody>
-      </p:sp>
-      <p:pic>
-        <p:nvPicPr>
-          <p:cNvPr id="5" name="Picture 4"/>
-          <p:cNvPicPr>
-            <a:picLocks noChangeAspect="1"/>
-          </p:cNvPicPr>
-          <p:nvPr/>
-        </p:nvPicPr>
-        <p:blipFill>
-          <a:blip r:embed="rId2" cstate="print">
-            <a:extLst>
-              <a:ext uri="{28A0092B-C50C-407E-A947-70E740481C1C}">
-                <a14:useLocalDpi xmlns:a14="http://schemas.microsoft.com/office/drawing/2010/main" val="0"/>
-              </a:ext>
-            </a:extLst>
-          </a:blip>
-          <a:stretch>
-            <a:fillRect/>
-          </a:stretch>
-        </p:blipFill>
-        <p:spPr>
-          <a:xfrm>
-            <a:off x="11126825" y="-1"/>
-            <a:ext cx="1065175" cy="612475"/>
-          </a:xfrm>
-          <a:prstGeom prst="rect">
-            <a:avLst/>
-          </a:prstGeom>
-        </p:spPr>
-      </p:pic>
-    </p:spTree>
-    <p:extLst>
-      <p:ext uri="{BB962C8B-B14F-4D97-AF65-F5344CB8AC3E}">
-        <p14:creationId xmlns:p14="http://schemas.microsoft.com/office/powerpoint/2010/main" val="1682894602"/>
       </p:ext>
     </p:extLst>
   </p:cSld>
@@ -5100,7 +5340,7 @@
   <a:extraClrSchemeLst/>
   <a:extLst>
     <a:ext uri="{05A4C25C-085E-4340-85A3-A5531E510DB2}">
-      <thm15:themeFamily xmlns:thm15="http://schemas.microsoft.com/office/thememl/2012/main" name="Office Theme" id="{62F939B6-93AF-4DB8-9C6B-D6C7DFDC589F}" vid="{4A3C46E8-61CC-4603-A589-7422A47A8E4A}"/>
+      <thm15:themeFamily xmlns:thm15="http://schemas.microsoft.com/office/thememl/2012/main" xmlns="" name="Office Theme" id="{62F939B6-93AF-4DB8-9C6B-D6C7DFDC589F}" vid="{4A3C46E8-61CC-4603-A589-7422A47A8E4A}"/>
     </a:ext>
   </a:extLst>
 </a:theme>

</xml_diff>

<commit_message>
Made the Presentation more colorful
</commit_message>
<xml_diff>
--- a/Documentation/PresentationAlpha.pptx
+++ b/Documentation/PresentationAlpha.pptx
@@ -117,7 +117,7 @@
   </p:defaultTextStyle>
   <p:extLst>
     <p:ext uri="{EFAFB233-063F-42B5-8137-9DF3F51BA10A}">
-      <p15:sldGuideLst xmlns:p15="http://schemas.microsoft.com/office/powerpoint/2012/main" xmlns="">
+      <p15:sldGuideLst xmlns="" xmlns:p15="http://schemas.microsoft.com/office/powerpoint/2012/main">
         <p15:guide id="1" orient="horz" pos="2160">
           <p15:clr>
             <a:srgbClr val="A4A3A4"/>
@@ -2985,10 +2985,7 @@
           <a:bodyPr/>
           <a:lstStyle/>
           <a:p>
-            <a:r>
-              <a:rPr lang="en-US" dirty="0"/>
-              <a:t>Wand Man</a:t>
-            </a:r>
+            <a:endParaRPr lang="en-US" dirty="0"/>
           </a:p>
         </p:txBody>
       </p:sp>
@@ -3008,9 +3005,34 @@
           <a:lstStyle/>
           <a:p>
             <a:r>
-              <a:rPr lang="en-US" dirty="0"/>
-              <a:t>By MagiDev</a:t>
-            </a:r>
+              <a:rPr lang="en-US" dirty="0" smtClean="0"/>
+              <a:t>By Team </a:t>
+            </a:r>
+            <a:r>
+              <a:rPr lang="en-US" dirty="0" err="1" smtClean="0">
+                <a:solidFill>
+                  <a:srgbClr val="FF0000"/>
+                </a:solidFill>
+              </a:rPr>
+              <a:t>Magi</a:t>
+            </a:r>
+            <a:r>
+              <a:rPr lang="en-US" dirty="0" err="1" smtClean="0">
+                <a:solidFill>
+                  <a:schemeClr val="bg2">
+                    <a:lumMod val="50000"/>
+                  </a:schemeClr>
+                </a:solidFill>
+              </a:rPr>
+              <a:t>Dev</a:t>
+            </a:r>
+            <a:endParaRPr lang="en-US" dirty="0">
+              <a:solidFill>
+                <a:schemeClr val="bg2">
+                  <a:lumMod val="50000"/>
+                </a:schemeClr>
+              </a:solidFill>
+            </a:endParaRPr>
           </a:p>
         </p:txBody>
       </p:sp>
@@ -3044,6 +3066,48 @@
           </a:prstGeom>
         </p:spPr>
       </p:pic>
+      <p:pic>
+        <p:nvPicPr>
+          <p:cNvPr id="5" name="Picture 4"/>
+          <p:cNvPicPr>
+            <a:picLocks noChangeAspect="1"/>
+          </p:cNvPicPr>
+          <p:nvPr/>
+        </p:nvPicPr>
+        <p:blipFill>
+          <a:blip r:embed="rId3">
+            <a:extLst>
+              <a:ext uri="{BEBA8EAE-BF5A-486C-A8C5-ECC9F3942E4B}">
+                <a14:imgProps xmlns:a14="http://schemas.microsoft.com/office/drawing/2010/main">
+                  <a14:imgLayer r:embed="rId4">
+                    <a14:imgEffect>
+                      <a14:sharpenSoften amount="50000"/>
+                    </a14:imgEffect>
+                    <a14:imgEffect>
+                      <a14:brightnessContrast contrast="-20000"/>
+                    </a14:imgEffect>
+                  </a14:imgLayer>
+                </a14:imgProps>
+              </a:ext>
+              <a:ext uri="{28A0092B-C50C-407E-A947-70E740481C1C}">
+                <a14:useLocalDpi xmlns:a14="http://schemas.microsoft.com/office/drawing/2010/main" val="0"/>
+              </a:ext>
+            </a:extLst>
+          </a:blip>
+          <a:stretch>
+            <a:fillRect/>
+          </a:stretch>
+        </p:blipFill>
+        <p:spPr>
+          <a:xfrm>
+            <a:off x="3567855" y="-96785"/>
+            <a:ext cx="4882328" cy="4882328"/>
+          </a:xfrm>
+          <a:prstGeom prst="rect">
+            <a:avLst/>
+          </a:prstGeom>
+        </p:spPr>
+      </p:pic>
     </p:spTree>
     <p:extLst>
       <p:ext uri="{BB962C8B-B14F-4D97-AF65-F5344CB8AC3E}">
@@ -3054,6 +3118,13 @@
   <p:clrMapOvr>
     <a:masterClrMapping/>
   </p:clrMapOvr>
+  <p:timing>
+    <p:tnLst>
+      <p:par>
+        <p:cTn id="1" dur="indefinite" restart="never" nodeType="tmRoot"/>
+      </p:par>
+    </p:tnLst>
+  </p:timing>
 </p:sld>
 </file>
 
@@ -3118,11 +3189,23 @@
               <a:buNone/>
             </a:pPr>
             <a:r>
-              <a:rPr lang="en-US" dirty="0"/>
+              <a:rPr lang="en-US" dirty="0">
+                <a:solidFill>
+                  <a:schemeClr val="accent2">
+                    <a:lumMod val="50000"/>
+                  </a:schemeClr>
+                </a:solidFill>
+              </a:rPr>
               <a:t>E</a:t>
             </a:r>
             <a:r>
-              <a:rPr lang="en-US" dirty="0" smtClean="0"/>
+              <a:rPr lang="en-US" dirty="0" smtClean="0">
+                <a:solidFill>
+                  <a:schemeClr val="accent2">
+                    <a:lumMod val="50000"/>
+                  </a:schemeClr>
+                </a:solidFill>
+              </a:rPr>
               <a:t>nemies:</a:t>
             </a:r>
           </a:p>
@@ -3189,11 +3272,23 @@
               <a:buNone/>
             </a:pPr>
             <a:r>
-              <a:rPr lang="en-US" dirty="0" smtClean="0"/>
+              <a:rPr lang="en-US" dirty="0" smtClean="0">
+                <a:solidFill>
+                  <a:schemeClr val="accent6">
+                    <a:lumMod val="50000"/>
+                  </a:schemeClr>
+                </a:solidFill>
+              </a:rPr>
               <a:t>Player </a:t>
             </a:r>
             <a:r>
-              <a:rPr lang="en-US" dirty="0"/>
+              <a:rPr lang="en-US" dirty="0">
+                <a:solidFill>
+                  <a:schemeClr val="accent6">
+                    <a:lumMod val="50000"/>
+                  </a:schemeClr>
+                </a:solidFill>
+              </a:rPr>
               <a:t>Spells:</a:t>
             </a:r>
           </a:p>
@@ -3248,7 +3343,31 @@
             </a:pPr>
             <a:r>
               <a:rPr lang="en-US" dirty="0" smtClean="0"/>
-              <a:t>Water Stream</a:t>
+              <a:t>Water </a:t>
+            </a:r>
+            <a:r>
+              <a:rPr lang="en-US" dirty="0" smtClean="0"/>
+              <a:t>Stream</a:t>
+            </a:r>
+          </a:p>
+          <a:p>
+            <a:pPr marL="971550" lvl="1" indent="-514350">
+              <a:buFont typeface="+mj-lt"/>
+              <a:buAutoNum type="arabicPeriod"/>
+            </a:pPr>
+            <a:r>
+              <a:rPr lang="en-US" dirty="0" smtClean="0"/>
+              <a:t>Rainbow Shot</a:t>
+            </a:r>
+          </a:p>
+          <a:p>
+            <a:pPr marL="971550" lvl="1" indent="-514350">
+              <a:buFont typeface="+mj-lt"/>
+              <a:buAutoNum type="arabicPeriod"/>
+            </a:pPr>
+            <a:r>
+              <a:rPr lang="en-US" dirty="0" smtClean="0"/>
+              <a:t>Bone Shot</a:t>
             </a:r>
             <a:endParaRPr lang="en-US" dirty="0"/>
           </a:p>
@@ -3363,7 +3482,13 @@
               <a:buAutoNum type="arabicPeriod"/>
             </a:pPr>
             <a:r>
-              <a:rPr lang="en-US" dirty="0" smtClean="0"/>
+              <a:rPr lang="en-US" dirty="0" smtClean="0">
+                <a:solidFill>
+                  <a:schemeClr val="accent2">
+                    <a:lumMod val="50000"/>
+                  </a:schemeClr>
+                </a:solidFill>
+              </a:rPr>
               <a:t>Enemy Attack Animations</a:t>
             </a:r>
           </a:p>
@@ -3373,10 +3498,22 @@
               <a:buAutoNum type="arabicPeriod"/>
             </a:pPr>
             <a:r>
-              <a:rPr lang="en-US" dirty="0" smtClean="0"/>
+              <a:rPr lang="en-US" dirty="0" smtClean="0">
+                <a:solidFill>
+                  <a:schemeClr val="accent2">
+                    <a:lumMod val="50000"/>
+                  </a:schemeClr>
+                </a:solidFill>
+              </a:rPr>
               <a:t>Enemy Movement Animations</a:t>
             </a:r>
-            <a:endParaRPr lang="en-US" dirty="0"/>
+            <a:endParaRPr lang="en-US" dirty="0">
+              <a:solidFill>
+                <a:schemeClr val="accent2">
+                  <a:lumMod val="50000"/>
+                </a:schemeClr>
+              </a:solidFill>
+            </a:endParaRPr>
           </a:p>
         </p:txBody>
       </p:sp>
@@ -3399,7 +3536,13 @@
               <a:buNone/>
             </a:pPr>
             <a:r>
-              <a:rPr lang="en-US" dirty="0" smtClean="0"/>
+              <a:rPr lang="en-US" dirty="0" smtClean="0">
+                <a:solidFill>
+                  <a:schemeClr val="accent1">
+                    <a:lumMod val="50000"/>
+                  </a:schemeClr>
+                </a:solidFill>
+              </a:rPr>
               <a:t>3.   Player Spell Animations</a:t>
             </a:r>
           </a:p>
@@ -3408,7 +3551,11 @@
               <a:buNone/>
             </a:pPr>
             <a:r>
-              <a:rPr lang="en-US" dirty="0" smtClean="0"/>
+              <a:rPr lang="en-US" dirty="0" smtClean="0">
+                <a:solidFill>
+                  <a:srgbClr val="C00000"/>
+                </a:solidFill>
+              </a:rPr>
               <a:t>4.   Boss Attack Animations</a:t>
             </a:r>
           </a:p>
@@ -3417,10 +3564,18 @@
               <a:buNone/>
             </a:pPr>
             <a:r>
-              <a:rPr lang="en-US" dirty="0" smtClean="0"/>
+              <a:rPr lang="en-US" dirty="0" smtClean="0">
+                <a:solidFill>
+                  <a:srgbClr val="C00000"/>
+                </a:solidFill>
+              </a:rPr>
               <a:t>5.   Boss Movement Animations</a:t>
             </a:r>
-            <a:endParaRPr lang="en-US" dirty="0"/>
+            <a:endParaRPr lang="en-US" dirty="0">
+              <a:solidFill>
+                <a:srgbClr val="C00000"/>
+              </a:solidFill>
+            </a:endParaRPr>
           </a:p>
         </p:txBody>
       </p:sp>
@@ -3528,7 +3683,13 @@
               <a:buNone/>
             </a:pPr>
             <a:r>
-              <a:rPr lang="en-US" dirty="0" smtClean="0"/>
+              <a:rPr lang="en-US" dirty="0" smtClean="0">
+                <a:solidFill>
+                  <a:schemeClr val="accent5">
+                    <a:lumMod val="50000"/>
+                  </a:schemeClr>
+                </a:solidFill>
+              </a:rPr>
               <a:t>Movement And Hurt Sound Effects</a:t>
             </a:r>
           </a:p>
@@ -3607,7 +3768,13 @@
               <a:buNone/>
             </a:pPr>
             <a:r>
-              <a:rPr lang="en-US" dirty="0" smtClean="0"/>
+              <a:rPr lang="en-US" dirty="0" smtClean="0">
+                <a:solidFill>
+                  <a:schemeClr val="accent2">
+                    <a:lumMod val="75000"/>
+                  </a:schemeClr>
+                </a:solidFill>
+              </a:rPr>
               <a:t>Attack Sound Effects</a:t>
             </a:r>
           </a:p>
@@ -3715,10 +3882,30 @@
               <a:t>Team </a:t>
             </a:r>
             <a:r>
-              <a:rPr lang="en-US" dirty="0" err="1" smtClean="0"/>
-              <a:t>MagiDev</a:t>
-            </a:r>
-            <a:endParaRPr lang="en-US" dirty="0"/>
+              <a:rPr lang="en-US" dirty="0" err="1" smtClean="0">
+                <a:solidFill>
+                  <a:srgbClr val="FF0000"/>
+                </a:solidFill>
+              </a:rPr>
+              <a:t>Magi</a:t>
+            </a:r>
+            <a:r>
+              <a:rPr lang="en-US" dirty="0" err="1" smtClean="0">
+                <a:solidFill>
+                  <a:schemeClr val="bg2">
+                    <a:lumMod val="50000"/>
+                  </a:schemeClr>
+                </a:solidFill>
+              </a:rPr>
+              <a:t>Dev</a:t>
+            </a:r>
+            <a:endParaRPr lang="en-US" dirty="0">
+              <a:solidFill>
+                <a:schemeClr val="bg2">
+                  <a:lumMod val="50000"/>
+                </a:schemeClr>
+              </a:solidFill>
+            </a:endParaRPr>
           </a:p>
         </p:txBody>
       </p:sp>
@@ -3818,6 +4005,13 @@
   <p:clrMapOvr>
     <a:masterClrMapping/>
   </p:clrMapOvr>
+  <p:timing>
+    <p:tnLst>
+      <p:par>
+        <p:cTn id="1" dur="indefinite" restart="never" nodeType="tmRoot"/>
+      </p:par>
+    </p:tnLst>
+  </p:timing>
 </p:sld>
 </file>
 
@@ -3987,6 +4181,13 @@
   <p:clrMapOvr>
     <a:masterClrMapping/>
   </p:clrMapOvr>
+  <p:timing>
+    <p:tnLst>
+      <p:par>
+        <p:cTn id="1" dur="indefinite" restart="never" nodeType="tmRoot"/>
+      </p:par>
+    </p:tnLst>
+  </p:timing>
 </p:sld>
 </file>
 
@@ -4019,15 +4220,29 @@
         </p:nvSpPr>
         <p:spPr/>
         <p:txBody>
-          <a:bodyPr/>
+          <a:bodyPr>
+            <a:normAutofit/>
+          </a:bodyPr>
           <a:lstStyle/>
           <a:p>
             <a:pPr algn="ctr"/>
             <a:r>
-              <a:rPr lang="en-US" dirty="0" smtClean="0"/>
+              <a:rPr lang="en-US" sz="6000" dirty="0" smtClean="0">
+                <a:solidFill>
+                  <a:schemeClr val="accent6">
+                    <a:lumMod val="50000"/>
+                  </a:schemeClr>
+                </a:solidFill>
+              </a:rPr>
               <a:t>Game Demo</a:t>
             </a:r>
-            <a:endParaRPr lang="en-US" dirty="0"/>
+            <a:endParaRPr lang="en-US" sz="6000" dirty="0">
+              <a:solidFill>
+                <a:schemeClr val="accent6">
+                  <a:lumMod val="50000"/>
+                </a:schemeClr>
+              </a:solidFill>
+            </a:endParaRPr>
           </a:p>
         </p:txBody>
       </p:sp>
@@ -4046,7 +4261,7 @@
           <a:bodyPr/>
           <a:lstStyle/>
           <a:p>
-            <a:endParaRPr lang="en-US"/>
+            <a:endParaRPr lang="en-US" dirty="0"/>
           </a:p>
         </p:txBody>
       </p:sp>
@@ -4060,6 +4275,13 @@
   <p:clrMapOvr>
     <a:masterClrMapping/>
   </p:clrMapOvr>
+  <p:timing>
+    <p:tnLst>
+      <p:par>
+        <p:cTn id="1" dur="indefinite" restart="never" nodeType="tmRoot"/>
+      </p:par>
+    </p:tnLst>
+  </p:timing>
 </p:sld>
 </file>
 
@@ -4505,7 +4727,13 @@
               <a:buAutoNum type="arabicPeriod"/>
             </a:pPr>
             <a:r>
-              <a:rPr lang="en-US" dirty="0" smtClean="0"/>
+              <a:rPr lang="en-US" dirty="0" smtClean="0">
+                <a:solidFill>
+                  <a:schemeClr val="accent1">
+                    <a:lumMod val="50000"/>
+                  </a:schemeClr>
+                </a:solidFill>
+              </a:rPr>
               <a:t>Player Sound Effects</a:t>
             </a:r>
           </a:p>
@@ -4558,7 +4786,13 @@
               <a:buAutoNum type="arabicPeriod"/>
             </a:pPr>
             <a:r>
-              <a:rPr lang="en-US" dirty="0" smtClean="0"/>
+              <a:rPr lang="en-US" dirty="0" smtClean="0">
+                <a:solidFill>
+                  <a:schemeClr val="accent2">
+                    <a:lumMod val="50000"/>
+                  </a:schemeClr>
+                </a:solidFill>
+              </a:rPr>
               <a:t>Enemy Sound Effects</a:t>
             </a:r>
           </a:p>
@@ -4680,6 +4914,7 @@
           <a:bodyPr/>
           <a:lstStyle/>
           <a:p>
+            <a:pPr algn="ctr"/>
             <a:r>
               <a:rPr lang="en-US" dirty="0" smtClean="0"/>
               <a:t>Sound Effect Showcase</a:t>
@@ -4799,7 +5034,13 @@
               <a:buAutoNum type="arabicPeriod"/>
             </a:pPr>
             <a:r>
-              <a:rPr lang="en-US" dirty="0" smtClean="0"/>
+              <a:rPr lang="en-US" dirty="0" smtClean="0">
+                <a:solidFill>
+                  <a:schemeClr val="accent1">
+                    <a:lumMod val="50000"/>
+                  </a:schemeClr>
+                </a:solidFill>
+              </a:rPr>
               <a:t>Player Assets</a:t>
             </a:r>
           </a:p>
@@ -4846,7 +5087,13 @@
               <a:buAutoNum type="arabicPeriod"/>
             </a:pPr>
             <a:r>
-              <a:rPr lang="en-US" dirty="0" smtClean="0"/>
+              <a:rPr lang="en-US" dirty="0" smtClean="0">
+                <a:solidFill>
+                  <a:schemeClr val="accent4">
+                    <a:lumMod val="50000"/>
+                  </a:schemeClr>
+                </a:solidFill>
+              </a:rPr>
               <a:t>Map Assets</a:t>
             </a:r>
           </a:p>
@@ -4900,7 +5147,13 @@
               <a:buAutoNum type="arabicPeriod"/>
             </a:pPr>
             <a:r>
-              <a:rPr lang="en-US" dirty="0" smtClean="0"/>
+              <a:rPr lang="en-US" dirty="0" smtClean="0">
+                <a:solidFill>
+                  <a:schemeClr val="accent2">
+                    <a:lumMod val="50000"/>
+                  </a:schemeClr>
+                </a:solidFill>
+              </a:rPr>
               <a:t>Enemy Assets</a:t>
             </a:r>
           </a:p>
@@ -5015,6 +5268,7 @@
           <a:bodyPr/>
           <a:lstStyle/>
           <a:p>
+            <a:pPr algn="ctr"/>
             <a:r>
               <a:rPr lang="en-US" dirty="0" smtClean="0"/>
               <a:t>Art Showcase</a:t>
@@ -5340,7 +5594,7 @@
   <a:extraClrSchemeLst/>
   <a:extLst>
     <a:ext uri="{05A4C25C-085E-4340-85A3-A5531E510DB2}">
-      <thm15:themeFamily xmlns:thm15="http://schemas.microsoft.com/office/thememl/2012/main" xmlns="" name="Office Theme" id="{62F939B6-93AF-4DB8-9C6B-D6C7DFDC589F}" vid="{4A3C46E8-61CC-4603-A589-7422A47A8E4A}"/>
+      <thm15:themeFamily xmlns="" xmlns:thm15="http://schemas.microsoft.com/office/thememl/2012/main" name="Office Theme" id="{62F939B6-93AF-4DB8-9C6B-D6C7DFDC589F}" vid="{4A3C46E8-61CC-4603-A589-7422A47A8E4A}"/>
     </a:ext>
   </a:extLst>
 </a:theme>

</xml_diff>